<commit_message>
add custom stream source v1
</commit_message>
<xml_diff>
--- a/Spark_Custom_Stream_Sources.pptx
+++ b/Spark_Custom_Stream_Sources.pptx
@@ -5,21 +5,24 @@
     <p:sldMasterId id="2147483648" r:id="rId1"/>
   </p:sldMasterIdLst>
   <p:notesMasterIdLst>
-    <p:notesMasterId r:id="rId14"/>
+    <p:notesMasterId r:id="rId17"/>
   </p:notesMasterIdLst>
   <p:sldIdLst>
     <p:sldId id="257" r:id="rId2"/>
     <p:sldId id="272" r:id="rId3"/>
     <p:sldId id="260" r:id="rId4"/>
-    <p:sldId id="273" r:id="rId5"/>
-    <p:sldId id="274" r:id="rId6"/>
-    <p:sldId id="275" r:id="rId7"/>
-    <p:sldId id="276" r:id="rId8"/>
-    <p:sldId id="277" r:id="rId9"/>
-    <p:sldId id="278" r:id="rId10"/>
-    <p:sldId id="279" r:id="rId11"/>
-    <p:sldId id="269" r:id="rId12"/>
-    <p:sldId id="270" r:id="rId13"/>
+    <p:sldId id="281" r:id="rId5"/>
+    <p:sldId id="273" r:id="rId6"/>
+    <p:sldId id="274" r:id="rId7"/>
+    <p:sldId id="275" r:id="rId8"/>
+    <p:sldId id="276" r:id="rId9"/>
+    <p:sldId id="277" r:id="rId10"/>
+    <p:sldId id="278" r:id="rId11"/>
+    <p:sldId id="279" r:id="rId12"/>
+    <p:sldId id="280" r:id="rId13"/>
+    <p:sldId id="283" r:id="rId14"/>
+    <p:sldId id="269" r:id="rId15"/>
+    <p:sldId id="270" r:id="rId16"/>
   </p:sldIdLst>
   <p:sldSz cx="12192000" cy="6858000"/>
   <p:notesSz cx="6858000" cy="9144000"/>
@@ -208,7 +211,7 @@
           <a:p>
             <a:fld id="{6FE37721-1188-47D5-9044-022ECE8C9E54}" type="datetimeFigureOut">
               <a:rPr lang="ru-RU" smtClean="0"/>
-              <a:t>17.04.2021</a:t>
+              <a:t>18.04.2021</a:t>
             </a:fld>
             <a:endParaRPr lang="ru-RU"/>
           </a:p>
@@ -607,7 +610,7 @@
           <a:p>
             <a:fld id="{B7A4174B-3865-4C52-8BB2-B1080AE4813B}" type="datetimeFigureOut">
               <a:rPr lang="ru-RU" smtClean="0"/>
-              <a:t>17.04.2021</a:t>
+              <a:t>18.04.2021</a:t>
             </a:fld>
             <a:endParaRPr lang="ru-RU"/>
           </a:p>
@@ -777,7 +780,7 @@
           <a:p>
             <a:fld id="{B7A4174B-3865-4C52-8BB2-B1080AE4813B}" type="datetimeFigureOut">
               <a:rPr lang="ru-RU" smtClean="0"/>
-              <a:t>17.04.2021</a:t>
+              <a:t>18.04.2021</a:t>
             </a:fld>
             <a:endParaRPr lang="ru-RU"/>
           </a:p>
@@ -957,7 +960,7 @@
           <a:p>
             <a:fld id="{B7A4174B-3865-4C52-8BB2-B1080AE4813B}" type="datetimeFigureOut">
               <a:rPr lang="ru-RU" smtClean="0"/>
-              <a:t>17.04.2021</a:t>
+              <a:t>18.04.2021</a:t>
             </a:fld>
             <a:endParaRPr lang="ru-RU"/>
           </a:p>
@@ -1127,7 +1130,7 @@
           <a:p>
             <a:fld id="{B7A4174B-3865-4C52-8BB2-B1080AE4813B}" type="datetimeFigureOut">
               <a:rPr lang="ru-RU" smtClean="0"/>
-              <a:t>17.04.2021</a:t>
+              <a:t>18.04.2021</a:t>
             </a:fld>
             <a:endParaRPr lang="ru-RU"/>
           </a:p>
@@ -1373,7 +1376,7 @@
           <a:p>
             <a:fld id="{B7A4174B-3865-4C52-8BB2-B1080AE4813B}" type="datetimeFigureOut">
               <a:rPr lang="ru-RU" smtClean="0"/>
-              <a:t>17.04.2021</a:t>
+              <a:t>18.04.2021</a:t>
             </a:fld>
             <a:endParaRPr lang="ru-RU"/>
           </a:p>
@@ -1605,7 +1608,7 @@
           <a:p>
             <a:fld id="{B7A4174B-3865-4C52-8BB2-B1080AE4813B}" type="datetimeFigureOut">
               <a:rPr lang="ru-RU" smtClean="0"/>
-              <a:t>17.04.2021</a:t>
+              <a:t>18.04.2021</a:t>
             </a:fld>
             <a:endParaRPr lang="ru-RU"/>
           </a:p>
@@ -1972,7 +1975,7 @@
           <a:p>
             <a:fld id="{B7A4174B-3865-4C52-8BB2-B1080AE4813B}" type="datetimeFigureOut">
               <a:rPr lang="ru-RU" smtClean="0"/>
-              <a:t>17.04.2021</a:t>
+              <a:t>18.04.2021</a:t>
             </a:fld>
             <a:endParaRPr lang="ru-RU"/>
           </a:p>
@@ -2090,7 +2093,7 @@
           <a:p>
             <a:fld id="{B7A4174B-3865-4C52-8BB2-B1080AE4813B}" type="datetimeFigureOut">
               <a:rPr lang="ru-RU" smtClean="0"/>
-              <a:t>17.04.2021</a:t>
+              <a:t>18.04.2021</a:t>
             </a:fld>
             <a:endParaRPr lang="ru-RU"/>
           </a:p>
@@ -2185,7 +2188,7 @@
           <a:p>
             <a:fld id="{B7A4174B-3865-4C52-8BB2-B1080AE4813B}" type="datetimeFigureOut">
               <a:rPr lang="ru-RU" smtClean="0"/>
-              <a:t>17.04.2021</a:t>
+              <a:t>18.04.2021</a:t>
             </a:fld>
             <a:endParaRPr lang="ru-RU"/>
           </a:p>
@@ -2462,7 +2465,7 @@
           <a:p>
             <a:fld id="{B7A4174B-3865-4C52-8BB2-B1080AE4813B}" type="datetimeFigureOut">
               <a:rPr lang="ru-RU" smtClean="0"/>
-              <a:t>17.04.2021</a:t>
+              <a:t>18.04.2021</a:t>
             </a:fld>
             <a:endParaRPr lang="ru-RU"/>
           </a:p>
@@ -2715,7 +2718,7 @@
           <a:p>
             <a:fld id="{B7A4174B-3865-4C52-8BB2-B1080AE4813B}" type="datetimeFigureOut">
               <a:rPr lang="ru-RU" smtClean="0"/>
-              <a:t>17.04.2021</a:t>
+              <a:t>18.04.2021</a:t>
             </a:fld>
             <a:endParaRPr lang="ru-RU"/>
           </a:p>
@@ -2928,7 +2931,7 @@
           <a:p>
             <a:fld id="{B7A4174B-3865-4C52-8BB2-B1080AE4813B}" type="datetimeFigureOut">
               <a:rPr lang="ru-RU" smtClean="0"/>
-              <a:t>17.04.2021</a:t>
+              <a:t>18.04.2021</a:t>
             </a:fld>
             <a:endParaRPr lang="ru-RU"/>
           </a:p>
@@ -3439,11 +3442,7 @@
             <a:pPr algn="r"/>
             <a:r>
               <a:rPr lang="en-US" dirty="0" smtClean="0"/>
-              <a:t>May </a:t>
-            </a:r>
-            <a:r>
-              <a:rPr lang="en-US" dirty="0" smtClean="0"/>
-              <a:t>2021</a:t>
+              <a:t>May 2021</a:t>
             </a:r>
             <a:endParaRPr lang="ru-RU" dirty="0"/>
           </a:p>
@@ -3521,14 +3520,14 @@
       </p:sp>
       <p:sp>
         <p:nvSpPr>
-          <p:cNvPr id="3" name="Прямоугольник 2"/>
+          <p:cNvPr id="6" name="Прямоугольник 5"/>
           <p:cNvSpPr/>
           <p:nvPr/>
         </p:nvSpPr>
         <p:spPr>
           <a:xfrm>
-            <a:off x="-70339" y="956167"/>
-            <a:ext cx="12192000" cy="5940088"/>
+            <a:off x="411982" y="1166843"/>
+            <a:ext cx="11535508" cy="5262979"/>
           </a:xfrm>
           <a:prstGeom prst="rect">
             <a:avLst/>
@@ -3541,185 +3540,126 @@
           <a:lstStyle/>
           <a:p>
             <a:r>
-              <a:rPr lang="en-US" sz="2000" dirty="0"/>
-              <a:t> /**</a:t>
-            </a:r>
-          </a:p>
-          <a:p>
-            <a:r>
-              <a:rPr lang="en-US" sz="2000" dirty="0"/>
-              <a:t>   * Returns the data that is between the offsets (`start`, `end`]. When `start` is `None`,</a:t>
-            </a:r>
-          </a:p>
-          <a:p>
-            <a:r>
-              <a:rPr lang="en-US" sz="2000" dirty="0"/>
-              <a:t>   * then the batch should begin with the first record. This method must always return the</a:t>
-            </a:r>
-          </a:p>
-          <a:p>
-            <a:r>
-              <a:rPr lang="en-US" sz="2000" dirty="0"/>
-              <a:t>   * same data for a particular `start` and `end` pair; even after the Source has been restarted</a:t>
-            </a:r>
-          </a:p>
-          <a:p>
-            <a:r>
-              <a:rPr lang="en-US" sz="2000" dirty="0"/>
-              <a:t>   * on a different node.</a:t>
-            </a:r>
-          </a:p>
-          <a:p>
-            <a:r>
-              <a:rPr lang="en-US" sz="2000" dirty="0"/>
-              <a:t>   *</a:t>
-            </a:r>
-          </a:p>
-          <a:p>
-            <a:r>
-              <a:rPr lang="en-US" sz="2000" dirty="0"/>
-              <a:t>   * Higher layers will always call this method with a value of `start` greater than or equal</a:t>
-            </a:r>
-          </a:p>
-          <a:p>
-            <a:r>
-              <a:rPr lang="en-US" sz="2000" dirty="0"/>
-              <a:t>   * to the last value passed to `commit` and a value of `end` less than or equal to the</a:t>
-            </a:r>
-          </a:p>
-          <a:p>
-            <a:r>
-              <a:rPr lang="en-US" sz="2000" dirty="0"/>
-              <a:t>   * last value returned by `</a:t>
-            </a:r>
-            <a:r>
-              <a:rPr lang="en-US" sz="2000" dirty="0" err="1"/>
+              <a:rPr lang="en-US" sz="2400" dirty="0"/>
+              <a:t> /** Returns the schema of the data from this source */</a:t>
+            </a:r>
+          </a:p>
+          <a:p>
+            <a:r>
+              <a:rPr lang="en-US" sz="2400" dirty="0"/>
+              <a:t>  </a:t>
+            </a:r>
+            <a:r>
+              <a:rPr lang="en-US" sz="2400" b="1" dirty="0" err="1"/>
+              <a:t>def</a:t>
+            </a:r>
+            <a:r>
+              <a:rPr lang="en-US" sz="2400" b="1" dirty="0"/>
+              <a:t> schema: </a:t>
+            </a:r>
+            <a:r>
+              <a:rPr lang="en-US" sz="2400" b="1" dirty="0" err="1"/>
+              <a:t>StructType</a:t>
+            </a:r>
+            <a:endParaRPr lang="en-US" sz="2400" b="1" dirty="0"/>
+          </a:p>
+          <a:p>
+            <a:endParaRPr lang="en-US" sz="2400" dirty="0"/>
+          </a:p>
+          <a:p>
+            <a:r>
+              <a:rPr lang="en-US" sz="2400" dirty="0"/>
+              <a:t>  /**</a:t>
+            </a:r>
+          </a:p>
+          <a:p>
+            <a:r>
+              <a:rPr lang="en-US" sz="2400" dirty="0"/>
+              <a:t>   * Returns the maximum available offset for this source.</a:t>
+            </a:r>
+          </a:p>
+          <a:p>
+            <a:r>
+              <a:rPr lang="en-US" sz="2400" dirty="0"/>
+              <a:t>   * Returns `None` if this source has never received any data.</a:t>
+            </a:r>
+          </a:p>
+          <a:p>
+            <a:r>
+              <a:rPr lang="en-US" sz="2400" dirty="0"/>
+              <a:t>   */</a:t>
+            </a:r>
+          </a:p>
+          <a:p>
+            <a:r>
+              <a:rPr lang="en-US" sz="2400" dirty="0"/>
+              <a:t>  </a:t>
+            </a:r>
+            <a:r>
+              <a:rPr lang="en-US" sz="2400" b="1" dirty="0" err="1"/>
+              <a:t>def</a:t>
+            </a:r>
+            <a:r>
+              <a:rPr lang="en-US" sz="2400" b="1" dirty="0"/>
+              <a:t> </a:t>
+            </a:r>
+            <a:r>
+              <a:rPr lang="en-US" sz="2400" b="1" dirty="0" err="1"/>
               <a:t>getOffset</a:t>
             </a:r>
             <a:r>
-              <a:rPr lang="en-US" sz="2000" dirty="0"/>
-              <a:t>`</a:t>
-            </a:r>
-          </a:p>
-          <a:p>
-            <a:r>
-              <a:rPr lang="en-US" sz="2000" dirty="0"/>
-              <a:t>   *</a:t>
-            </a:r>
-          </a:p>
-          <a:p>
-            <a:r>
-              <a:rPr lang="en-US" sz="2000" dirty="0"/>
-              <a:t>   * It is possible for the [[Offset]] type to be a [[</a:t>
-            </a:r>
-            <a:r>
-              <a:rPr lang="en-US" sz="2000" dirty="0" err="1"/>
-              <a:t>SerializedOffset</a:t>
-            </a:r>
-            <a:r>
-              <a:rPr lang="en-US" sz="2000" dirty="0"/>
-              <a:t>]] when it was</a:t>
-            </a:r>
-          </a:p>
-          <a:p>
-            <a:r>
-              <a:rPr lang="en-US" sz="2000" dirty="0"/>
-              <a:t>   * obtained from the log. Moreover, [[</a:t>
-            </a:r>
-            <a:r>
-              <a:rPr lang="en-US" sz="2000" dirty="0" err="1"/>
-              <a:t>StreamExecution</a:t>
-            </a:r>
-            <a:r>
-              <a:rPr lang="en-US" sz="2000" dirty="0"/>
-              <a:t>]] only compares the [[Offset]]</a:t>
-            </a:r>
-          </a:p>
-          <a:p>
-            <a:r>
-              <a:rPr lang="en-US" sz="2000" dirty="0"/>
-              <a:t>   * JSON representation to determine if the two objects are equal. This could have</a:t>
-            </a:r>
-          </a:p>
-          <a:p>
-            <a:r>
-              <a:rPr lang="en-US" sz="2000" dirty="0"/>
-              <a:t>   * ramifications when upgrading [[Offset]] JSON formats i.e., two equivalent [[Offset]]</a:t>
-            </a:r>
-          </a:p>
-          <a:p>
-            <a:r>
-              <a:rPr lang="en-US" sz="2000" dirty="0"/>
-              <a:t>   * objects could differ between version. Consequently, [[</a:t>
-            </a:r>
-            <a:r>
-              <a:rPr lang="en-US" sz="2000" dirty="0" err="1"/>
-              <a:t>StreamExecution</a:t>
-            </a:r>
-            <a:r>
-              <a:rPr lang="en-US" sz="2000" dirty="0"/>
-              <a:t>]] may call</a:t>
-            </a:r>
-          </a:p>
-          <a:p>
-            <a:r>
-              <a:rPr lang="en-US" sz="2000" dirty="0"/>
-              <a:t>   * this method with two such equivalent [[Offset]] objects. In which case, the [[Source]]</a:t>
-            </a:r>
-          </a:p>
-          <a:p>
-            <a:r>
-              <a:rPr lang="en-US" sz="2000" dirty="0"/>
-              <a:t>   * should return an empty [[</a:t>
-            </a:r>
-            <a:r>
-              <a:rPr lang="en-US" sz="2000" dirty="0" err="1"/>
-              <a:t>DataFrame</a:t>
-            </a:r>
-            <a:r>
-              <a:rPr lang="en-US" sz="2000" dirty="0"/>
-              <a:t>]]</a:t>
-            </a:r>
-          </a:p>
-          <a:p>
-            <a:r>
-              <a:rPr lang="en-US" sz="2000" dirty="0"/>
+              <a:rPr lang="en-US" sz="2400" b="1" dirty="0"/>
+              <a:t>: Option[Offset]</a:t>
+            </a:r>
+          </a:p>
+          <a:p>
+            <a:endParaRPr lang="en-US" sz="2400" dirty="0"/>
+          </a:p>
+          <a:p>
+            <a:r>
+              <a:rPr lang="en-US" sz="2400" dirty="0"/>
+              <a:t>  /**</a:t>
+            </a:r>
+          </a:p>
+          <a:p>
+            <a:r>
+              <a:rPr lang="en-US" sz="2400" dirty="0"/>
+              <a:t>   * Informs the source that Spark has completed processing all data for offsets less than or</a:t>
+            </a:r>
+          </a:p>
+          <a:p>
+            <a:r>
+              <a:rPr lang="en-US" sz="2400" dirty="0"/>
+              <a:t>   * equal to `end` and will only request offsets greater than `end` in the future.</a:t>
+            </a:r>
+          </a:p>
+          <a:p>
+            <a:r>
+              <a:rPr lang="en-US" sz="2400" dirty="0"/>
               <a:t>   */</a:t>
             </a:r>
           </a:p>
           <a:p>
             <a:r>
-              <a:rPr lang="en-US" sz="2000" b="1" dirty="0"/>
+              <a:rPr lang="en-US" sz="2400" dirty="0"/>
               <a:t>  </a:t>
             </a:r>
             <a:r>
-              <a:rPr lang="en-US" sz="2000" b="1" dirty="0" err="1"/>
+              <a:rPr lang="en-US" sz="2400" b="1" dirty="0" err="1"/>
               <a:t>def</a:t>
             </a:r>
             <a:r>
-              <a:rPr lang="en-US" sz="2000" b="1" dirty="0"/>
-              <a:t> </a:t>
-            </a:r>
-            <a:r>
-              <a:rPr lang="en-US" sz="2000" b="1" dirty="0" err="1"/>
-              <a:t>getBatch</a:t>
-            </a:r>
-            <a:r>
-              <a:rPr lang="en-US" sz="2000" b="1" dirty="0"/>
-              <a:t>(start: Option[Offset], end: Offset): </a:t>
-            </a:r>
-            <a:r>
-              <a:rPr lang="en-US" sz="2000" b="1" dirty="0" err="1"/>
-              <a:t>DataFrame</a:t>
-            </a:r>
-            <a:endParaRPr lang="ru-RU" sz="2000" b="1" dirty="0"/>
+              <a:rPr lang="en-US" sz="2400" b="1" dirty="0"/>
+              <a:t> commit(end: Offset) : Unit = {}</a:t>
+            </a:r>
+            <a:endParaRPr lang="ru-RU" sz="2400" b="1" dirty="0"/>
           </a:p>
         </p:txBody>
       </p:sp>
     </p:spTree>
     <p:extLst>
       <p:ext uri="{BB962C8B-B14F-4D97-AF65-F5344CB8AC3E}">
-        <p14:creationId xmlns:p14="http://schemas.microsoft.com/office/powerpoint/2010/main" val="2919697120"/>
+        <p14:creationId xmlns:p14="http://schemas.microsoft.com/office/powerpoint/2010/main" val="3377010737"/>
       </p:ext>
     </p:extLst>
   </p:cSld>
@@ -3763,6 +3703,932 @@
             <p:ph type="title"/>
           </p:nvPr>
         </p:nvSpPr>
+        <p:spPr>
+          <a:xfrm>
+            <a:off x="767861" y="0"/>
+            <a:ext cx="10515600" cy="1325563"/>
+          </a:xfrm>
+        </p:spPr>
+        <p:txBody>
+          <a:bodyPr/>
+          <a:lstStyle/>
+          <a:p>
+            <a:pPr algn="ctr"/>
+            <a:r>
+              <a:rPr lang="en-US" dirty="0"/>
+              <a:t>t</a:t>
+            </a:r>
+            <a:r>
+              <a:rPr lang="en-US" dirty="0" smtClean="0"/>
+              <a:t>rait </a:t>
+            </a:r>
+            <a:r>
+              <a:rPr lang="en-US" b="1" dirty="0" smtClean="0"/>
+              <a:t>Source</a:t>
+            </a:r>
+            <a:endParaRPr lang="ru-RU" b="1" dirty="0"/>
+          </a:p>
+        </p:txBody>
+      </p:sp>
+      <p:sp>
+        <p:nvSpPr>
+          <p:cNvPr id="3" name="Прямоугольник 2"/>
+          <p:cNvSpPr/>
+          <p:nvPr/>
+        </p:nvSpPr>
+        <p:spPr>
+          <a:xfrm>
+            <a:off x="-70339" y="956167"/>
+            <a:ext cx="12192000" cy="5940088"/>
+          </a:xfrm>
+          <a:prstGeom prst="rect">
+            <a:avLst/>
+          </a:prstGeom>
+        </p:spPr>
+        <p:txBody>
+          <a:bodyPr wrap="square">
+            <a:spAutoFit/>
+          </a:bodyPr>
+          <a:lstStyle/>
+          <a:p>
+            <a:r>
+              <a:rPr lang="en-US" sz="2000" dirty="0"/>
+              <a:t> /**</a:t>
+            </a:r>
+          </a:p>
+          <a:p>
+            <a:r>
+              <a:rPr lang="en-US" sz="2000" dirty="0"/>
+              <a:t>   * Returns the data that is between the offsets (`start`, `end`]. When `start` is `None`,</a:t>
+            </a:r>
+          </a:p>
+          <a:p>
+            <a:r>
+              <a:rPr lang="en-US" sz="2000" dirty="0"/>
+              <a:t>   * then the batch should begin with the first record. This method must always return the</a:t>
+            </a:r>
+          </a:p>
+          <a:p>
+            <a:r>
+              <a:rPr lang="en-US" sz="2000" dirty="0"/>
+              <a:t>   * same data for a particular `start` and `end` pair; even after the Source has been restarted</a:t>
+            </a:r>
+          </a:p>
+          <a:p>
+            <a:r>
+              <a:rPr lang="en-US" sz="2000" dirty="0"/>
+              <a:t>   * on a different node.</a:t>
+            </a:r>
+          </a:p>
+          <a:p>
+            <a:r>
+              <a:rPr lang="en-US" sz="2000" dirty="0"/>
+              <a:t>   *</a:t>
+            </a:r>
+          </a:p>
+          <a:p>
+            <a:r>
+              <a:rPr lang="en-US" sz="2000" dirty="0"/>
+              <a:t>   * Higher layers will always call this method with a value of `start` greater than or equal</a:t>
+            </a:r>
+          </a:p>
+          <a:p>
+            <a:r>
+              <a:rPr lang="en-US" sz="2000" dirty="0"/>
+              <a:t>   * to the last value passed to `commit` and a value of `end` less than or equal to the</a:t>
+            </a:r>
+          </a:p>
+          <a:p>
+            <a:r>
+              <a:rPr lang="en-US" sz="2000" dirty="0"/>
+              <a:t>   * last value returned by `</a:t>
+            </a:r>
+            <a:r>
+              <a:rPr lang="en-US" sz="2000" dirty="0" err="1"/>
+              <a:t>getOffset</a:t>
+            </a:r>
+            <a:r>
+              <a:rPr lang="en-US" sz="2000" dirty="0"/>
+              <a:t>`</a:t>
+            </a:r>
+          </a:p>
+          <a:p>
+            <a:r>
+              <a:rPr lang="en-US" sz="2000" dirty="0"/>
+              <a:t>   *</a:t>
+            </a:r>
+          </a:p>
+          <a:p>
+            <a:r>
+              <a:rPr lang="en-US" sz="2000" dirty="0"/>
+              <a:t>   * It is possible for the [[Offset]] type to be a [[</a:t>
+            </a:r>
+            <a:r>
+              <a:rPr lang="en-US" sz="2000" dirty="0" err="1"/>
+              <a:t>SerializedOffset</a:t>
+            </a:r>
+            <a:r>
+              <a:rPr lang="en-US" sz="2000" dirty="0"/>
+              <a:t>]] when it was</a:t>
+            </a:r>
+          </a:p>
+          <a:p>
+            <a:r>
+              <a:rPr lang="en-US" sz="2000" dirty="0"/>
+              <a:t>   * obtained from the log. Moreover, [[</a:t>
+            </a:r>
+            <a:r>
+              <a:rPr lang="en-US" sz="2000" dirty="0" err="1"/>
+              <a:t>StreamExecution</a:t>
+            </a:r>
+            <a:r>
+              <a:rPr lang="en-US" sz="2000" dirty="0"/>
+              <a:t>]] only compares the [[Offset]]</a:t>
+            </a:r>
+          </a:p>
+          <a:p>
+            <a:r>
+              <a:rPr lang="en-US" sz="2000" dirty="0"/>
+              <a:t>   * JSON representation to determine if the two objects are equal. This could have</a:t>
+            </a:r>
+          </a:p>
+          <a:p>
+            <a:r>
+              <a:rPr lang="en-US" sz="2000" dirty="0"/>
+              <a:t>   * ramifications when upgrading [[Offset]] JSON formats i.e., two equivalent [[Offset]]</a:t>
+            </a:r>
+          </a:p>
+          <a:p>
+            <a:r>
+              <a:rPr lang="en-US" sz="2000" dirty="0"/>
+              <a:t>   * objects could differ between version. Consequently, [[</a:t>
+            </a:r>
+            <a:r>
+              <a:rPr lang="en-US" sz="2000" dirty="0" err="1"/>
+              <a:t>StreamExecution</a:t>
+            </a:r>
+            <a:r>
+              <a:rPr lang="en-US" sz="2000" dirty="0"/>
+              <a:t>]] may call</a:t>
+            </a:r>
+          </a:p>
+          <a:p>
+            <a:r>
+              <a:rPr lang="en-US" sz="2000" dirty="0"/>
+              <a:t>   * this method with two such equivalent [[Offset]] objects. In which case, the [[Source]]</a:t>
+            </a:r>
+          </a:p>
+          <a:p>
+            <a:r>
+              <a:rPr lang="en-US" sz="2000" dirty="0"/>
+              <a:t>   * should return an empty [[</a:t>
+            </a:r>
+            <a:r>
+              <a:rPr lang="en-US" sz="2000" dirty="0" err="1"/>
+              <a:t>DataFrame</a:t>
+            </a:r>
+            <a:r>
+              <a:rPr lang="en-US" sz="2000" dirty="0"/>
+              <a:t>]]</a:t>
+            </a:r>
+          </a:p>
+          <a:p>
+            <a:r>
+              <a:rPr lang="en-US" sz="2000" dirty="0"/>
+              <a:t>   */</a:t>
+            </a:r>
+          </a:p>
+          <a:p>
+            <a:r>
+              <a:rPr lang="en-US" sz="2000" b="1" dirty="0"/>
+              <a:t>  </a:t>
+            </a:r>
+            <a:r>
+              <a:rPr lang="en-US" sz="2000" b="1" dirty="0" err="1"/>
+              <a:t>def</a:t>
+            </a:r>
+            <a:r>
+              <a:rPr lang="en-US" sz="2000" b="1" dirty="0"/>
+              <a:t> </a:t>
+            </a:r>
+            <a:r>
+              <a:rPr lang="en-US" sz="2000" b="1" dirty="0" err="1"/>
+              <a:t>getBatch</a:t>
+            </a:r>
+            <a:r>
+              <a:rPr lang="en-US" sz="2000" b="1" dirty="0"/>
+              <a:t>(start: Option[Offset], end: Offset): </a:t>
+            </a:r>
+            <a:r>
+              <a:rPr lang="en-US" sz="2000" b="1" dirty="0" err="1"/>
+              <a:t>DataFrame</a:t>
+            </a:r>
+            <a:endParaRPr lang="ru-RU" sz="2000" b="1" dirty="0"/>
+          </a:p>
+        </p:txBody>
+      </p:sp>
+    </p:spTree>
+    <p:extLst>
+      <p:ext uri="{BB962C8B-B14F-4D97-AF65-F5344CB8AC3E}">
+        <p14:creationId xmlns:p14="http://schemas.microsoft.com/office/powerpoint/2010/main" val="2919697120"/>
+      </p:ext>
+    </p:extLst>
+  </p:cSld>
+  <p:clrMapOvr>
+    <a:masterClrMapping/>
+  </p:clrMapOvr>
+  <p:timing>
+    <p:tnLst>
+      <p:par>
+        <p:cTn id="1" dur="indefinite" restart="never" nodeType="tmRoot"/>
+      </p:par>
+    </p:tnLst>
+  </p:timing>
+</p:sld>
+</file>
+
+<file path=ppt/slides/slide12.xml><?xml version="1.0" encoding="utf-8"?>
+<p:sld xmlns:a="http://schemas.openxmlformats.org/drawingml/2006/main" xmlns:r="http://schemas.openxmlformats.org/officeDocument/2006/relationships" xmlns:p="http://schemas.openxmlformats.org/presentationml/2006/main">
+  <p:cSld>
+    <p:spTree>
+      <p:nvGrpSpPr>
+        <p:cNvPr id="1" name=""/>
+        <p:cNvGrpSpPr/>
+        <p:nvPr/>
+      </p:nvGrpSpPr>
+      <p:grpSpPr>
+        <a:xfrm>
+          <a:off x="0" y="0"/>
+          <a:ext cx="0" cy="0"/>
+          <a:chOff x="0" y="0"/>
+          <a:chExt cx="0" cy="0"/>
+        </a:xfrm>
+      </p:grpSpPr>
+      <p:sp>
+        <p:nvSpPr>
+          <p:cNvPr id="2" name="Заголовок 1"/>
+          <p:cNvSpPr>
+            <a:spLocks noGrp="1"/>
+          </p:cNvSpPr>
+          <p:nvPr>
+            <p:ph type="title"/>
+          </p:nvPr>
+        </p:nvSpPr>
+        <p:spPr>
+          <a:xfrm>
+            <a:off x="838200" y="0"/>
+            <a:ext cx="10515600" cy="1325563"/>
+          </a:xfrm>
+        </p:spPr>
+        <p:txBody>
+          <a:bodyPr/>
+          <a:lstStyle/>
+          <a:p>
+            <a:pPr algn="ctr"/>
+            <a:r>
+              <a:rPr lang="en-US" dirty="0" smtClean="0"/>
+              <a:t>Step </a:t>
+            </a:r>
+            <a:r>
+              <a:rPr lang="en-US" dirty="0" smtClean="0"/>
+              <a:t>2 (</a:t>
+            </a:r>
+            <a:r>
+              <a:rPr lang="en-US" dirty="0" err="1" smtClean="0"/>
+              <a:t>RandomInt</a:t>
+            </a:r>
+            <a:r>
+              <a:rPr lang="en-US" dirty="0" smtClean="0"/>
+              <a:t>)</a:t>
+            </a:r>
+            <a:endParaRPr lang="ru-RU" dirty="0"/>
+          </a:p>
+        </p:txBody>
+      </p:sp>
+      <p:sp>
+        <p:nvSpPr>
+          <p:cNvPr id="4" name="Прямоугольник 3"/>
+          <p:cNvSpPr/>
+          <p:nvPr/>
+        </p:nvSpPr>
+        <p:spPr>
+          <a:xfrm>
+            <a:off x="0" y="1325563"/>
+            <a:ext cx="12389618" cy="4401205"/>
+          </a:xfrm>
+          <a:prstGeom prst="rect">
+            <a:avLst/>
+          </a:prstGeom>
+        </p:spPr>
+        <p:txBody>
+          <a:bodyPr wrap="square">
+            <a:spAutoFit/>
+          </a:bodyPr>
+          <a:lstStyle/>
+          <a:p>
+            <a:r>
+              <a:rPr lang="en-US" sz="2800" dirty="0"/>
+              <a:t>class </a:t>
+            </a:r>
+            <a:r>
+              <a:rPr lang="en-US" sz="2800" dirty="0" err="1"/>
+              <a:t>RandomInt</a:t>
+            </a:r>
+            <a:r>
+              <a:rPr lang="en-US" sz="2800" dirty="0"/>
+              <a:t>(</a:t>
+            </a:r>
+            <a:r>
+              <a:rPr lang="en-US" sz="2800" dirty="0" err="1"/>
+              <a:t>sqlContext</a:t>
+            </a:r>
+            <a:r>
+              <a:rPr lang="en-US" sz="2800" dirty="0"/>
+              <a:t>: </a:t>
+            </a:r>
+            <a:r>
+              <a:rPr lang="en-US" sz="2800" dirty="0" err="1"/>
+              <a:t>SQLContext</a:t>
+            </a:r>
+            <a:r>
+              <a:rPr lang="en-US" sz="2800" dirty="0"/>
+              <a:t>) extends Source {</a:t>
+            </a:r>
+          </a:p>
+          <a:p>
+            <a:r>
+              <a:rPr lang="en-US" sz="2800" dirty="0"/>
+              <a:t>  override </a:t>
+            </a:r>
+            <a:r>
+              <a:rPr lang="en-US" sz="2800" dirty="0" err="1"/>
+              <a:t>def</a:t>
+            </a:r>
+            <a:r>
+              <a:rPr lang="en-US" sz="2800" dirty="0"/>
+              <a:t> schema: </a:t>
+            </a:r>
+            <a:r>
+              <a:rPr lang="en-US" sz="2800" dirty="0" err="1"/>
+              <a:t>StructType</a:t>
+            </a:r>
+            <a:r>
+              <a:rPr lang="en-US" sz="2800" dirty="0"/>
+              <a:t> =  </a:t>
+            </a:r>
+            <a:r>
+              <a:rPr lang="en-US" sz="2800" dirty="0" err="1"/>
+              <a:t>RandomInt.schema</a:t>
+            </a:r>
+            <a:endParaRPr lang="en-US" sz="2800" dirty="0"/>
+          </a:p>
+          <a:p>
+            <a:endParaRPr lang="en-US" sz="2800" dirty="0"/>
+          </a:p>
+          <a:p>
+            <a:r>
+              <a:rPr lang="en-US" sz="2800" dirty="0"/>
+              <a:t>  override </a:t>
+            </a:r>
+            <a:r>
+              <a:rPr lang="en-US" sz="2800" dirty="0" err="1"/>
+              <a:t>def</a:t>
+            </a:r>
+            <a:r>
+              <a:rPr lang="en-US" sz="2800" dirty="0"/>
+              <a:t> commit(end: Offset): Unit = {</a:t>
+            </a:r>
+          </a:p>
+          <a:p>
+            <a:r>
+              <a:rPr lang="en-US" sz="2800" dirty="0"/>
+              <a:t>    </a:t>
+            </a:r>
+            <a:r>
+              <a:rPr lang="en-US" sz="2800" dirty="0" err="1"/>
+              <a:t>println</a:t>
+            </a:r>
+            <a:r>
+              <a:rPr lang="en-US" sz="2800" dirty="0"/>
+              <a:t>(" commit" + offset)</a:t>
+            </a:r>
+          </a:p>
+          <a:p>
+            <a:r>
+              <a:rPr lang="en-US" sz="2800" dirty="0"/>
+              <a:t>  }</a:t>
+            </a:r>
+          </a:p>
+          <a:p>
+            <a:r>
+              <a:rPr lang="en-US" sz="2800" dirty="0"/>
+              <a:t>  private </a:t>
+            </a:r>
+            <a:r>
+              <a:rPr lang="en-US" sz="2800" dirty="0" err="1"/>
+              <a:t>var</a:t>
+            </a:r>
+            <a:r>
+              <a:rPr lang="en-US" sz="2800" dirty="0"/>
+              <a:t> offset: </a:t>
+            </a:r>
+            <a:r>
+              <a:rPr lang="en-US" sz="2800" dirty="0" err="1"/>
+              <a:t>LongOffset</a:t>
+            </a:r>
+            <a:r>
+              <a:rPr lang="en-US" sz="2800" dirty="0"/>
+              <a:t> = </a:t>
+            </a:r>
+            <a:r>
+              <a:rPr lang="en-US" sz="2800" dirty="0" err="1"/>
+              <a:t>LongOffset</a:t>
+            </a:r>
+            <a:r>
+              <a:rPr lang="en-US" sz="2800" dirty="0"/>
+              <a:t>(1)</a:t>
+            </a:r>
+          </a:p>
+          <a:p>
+            <a:r>
+              <a:rPr lang="en-US" sz="2800" dirty="0"/>
+              <a:t>  override </a:t>
+            </a:r>
+            <a:r>
+              <a:rPr lang="en-US" sz="2800" dirty="0" err="1"/>
+              <a:t>def</a:t>
+            </a:r>
+            <a:r>
+              <a:rPr lang="en-US" sz="2800" dirty="0"/>
+              <a:t> </a:t>
+            </a:r>
+            <a:r>
+              <a:rPr lang="en-US" sz="2800" dirty="0" err="1"/>
+              <a:t>getOffset</a:t>
+            </a:r>
+            <a:r>
+              <a:rPr lang="en-US" sz="2800" dirty="0"/>
+              <a:t>: Option[Offset] =  </a:t>
+            </a:r>
+            <a:r>
+              <a:rPr lang="en-US" sz="2800" dirty="0" err="1"/>
+              <a:t>this.synchronized</a:t>
+            </a:r>
+            <a:r>
+              <a:rPr lang="en-US" sz="2800" dirty="0"/>
+              <a:t> {</a:t>
+            </a:r>
+          </a:p>
+          <a:p>
+            <a:r>
+              <a:rPr lang="en-US" sz="2800" dirty="0"/>
+              <a:t>         if (</a:t>
+            </a:r>
+            <a:r>
+              <a:rPr lang="en-US" sz="2800" dirty="0" err="1"/>
+              <a:t>offset.offset</a:t>
+            </a:r>
+            <a:r>
+              <a:rPr lang="en-US" sz="2800" dirty="0"/>
+              <a:t> == -1) None else Some(offset)</a:t>
+            </a:r>
+          </a:p>
+          <a:p>
+            <a:r>
+              <a:rPr lang="en-US" sz="2800" dirty="0"/>
+              <a:t>  </a:t>
+            </a:r>
+            <a:r>
+              <a:rPr lang="en-US" sz="2800" dirty="0" smtClean="0"/>
+              <a:t>}</a:t>
+            </a:r>
+            <a:endParaRPr lang="en-US" sz="2800" dirty="0"/>
+          </a:p>
+        </p:txBody>
+      </p:sp>
+    </p:spTree>
+    <p:extLst>
+      <p:ext uri="{BB962C8B-B14F-4D97-AF65-F5344CB8AC3E}">
+        <p14:creationId xmlns:p14="http://schemas.microsoft.com/office/powerpoint/2010/main" val="4251475170"/>
+      </p:ext>
+    </p:extLst>
+  </p:cSld>
+  <p:clrMapOvr>
+    <a:masterClrMapping/>
+  </p:clrMapOvr>
+  <p:timing>
+    <p:tnLst>
+      <p:par>
+        <p:cTn id="1" dur="indefinite" restart="never" nodeType="tmRoot"/>
+      </p:par>
+    </p:tnLst>
+  </p:timing>
+</p:sld>
+</file>
+
+<file path=ppt/slides/slide13.xml><?xml version="1.0" encoding="utf-8"?>
+<p:sld xmlns:a="http://schemas.openxmlformats.org/drawingml/2006/main" xmlns:r="http://schemas.openxmlformats.org/officeDocument/2006/relationships" xmlns:p="http://schemas.openxmlformats.org/presentationml/2006/main">
+  <p:cSld>
+    <p:spTree>
+      <p:nvGrpSpPr>
+        <p:cNvPr id="1" name=""/>
+        <p:cNvGrpSpPr/>
+        <p:nvPr/>
+      </p:nvGrpSpPr>
+      <p:grpSpPr>
+        <a:xfrm>
+          <a:off x="0" y="0"/>
+          <a:ext cx="0" cy="0"/>
+          <a:chOff x="0" y="0"/>
+          <a:chExt cx="0" cy="0"/>
+        </a:xfrm>
+      </p:grpSpPr>
+      <p:sp>
+        <p:nvSpPr>
+          <p:cNvPr id="4" name="Прямоугольник 3"/>
+          <p:cNvSpPr/>
+          <p:nvPr/>
+        </p:nvSpPr>
+        <p:spPr>
+          <a:xfrm>
+            <a:off x="80387" y="856357"/>
+            <a:ext cx="12389618" cy="6001643"/>
+          </a:xfrm>
+          <a:prstGeom prst="rect">
+            <a:avLst/>
+          </a:prstGeom>
+        </p:spPr>
+        <p:txBody>
+          <a:bodyPr wrap="square">
+            <a:spAutoFit/>
+          </a:bodyPr>
+          <a:lstStyle/>
+          <a:p>
+            <a:endParaRPr lang="en-US" sz="2400" dirty="0"/>
+          </a:p>
+          <a:p>
+            <a:r>
+              <a:rPr lang="en-US" sz="2400" dirty="0"/>
+              <a:t>  override </a:t>
+            </a:r>
+            <a:r>
+              <a:rPr lang="en-US" sz="2400" dirty="0" err="1"/>
+              <a:t>def</a:t>
+            </a:r>
+            <a:r>
+              <a:rPr lang="en-US" sz="2400" dirty="0"/>
+              <a:t> </a:t>
+            </a:r>
+            <a:r>
+              <a:rPr lang="en-US" sz="2400" dirty="0" err="1"/>
+              <a:t>getBatch</a:t>
+            </a:r>
+            <a:r>
+              <a:rPr lang="en-US" sz="2400" dirty="0"/>
+              <a:t>(start: Option[Offset], end: Offset): </a:t>
+            </a:r>
+            <a:r>
+              <a:rPr lang="en-US" sz="2400" dirty="0" err="1"/>
+              <a:t>DataFrame</a:t>
+            </a:r>
+            <a:r>
+              <a:rPr lang="en-US" sz="2400" dirty="0"/>
+              <a:t> = {</a:t>
+            </a:r>
+          </a:p>
+          <a:p>
+            <a:r>
+              <a:rPr lang="en-US" sz="2400" dirty="0"/>
+              <a:t>    </a:t>
+            </a:r>
+            <a:r>
+              <a:rPr lang="en-US" sz="2400" dirty="0" err="1"/>
+              <a:t>println</a:t>
+            </a:r>
+            <a:r>
+              <a:rPr lang="en-US" sz="2400" dirty="0"/>
+              <a:t>(start + " --" + end)</a:t>
+            </a:r>
+          </a:p>
+          <a:p>
+            <a:r>
+              <a:rPr lang="en-US" sz="2400" dirty="0"/>
+              <a:t>    offset = offset.+(1)</a:t>
+            </a:r>
+          </a:p>
+          <a:p>
+            <a:r>
+              <a:rPr lang="en-US" sz="2400" dirty="0"/>
+              <a:t>    </a:t>
+            </a:r>
+            <a:r>
+              <a:rPr lang="en-US" sz="2400" dirty="0" err="1"/>
+              <a:t>val</a:t>
+            </a:r>
+            <a:r>
+              <a:rPr lang="en-US" sz="2400" dirty="0"/>
+              <a:t> data = </a:t>
+            </a:r>
+            <a:r>
+              <a:rPr lang="en-US" sz="2400" dirty="0" err="1"/>
+              <a:t>Seq</a:t>
+            </a:r>
+            <a:r>
+              <a:rPr lang="en-US" sz="2400" dirty="0"/>
+              <a:t>((1,1),(2,2))</a:t>
+            </a:r>
+          </a:p>
+          <a:p>
+            <a:r>
+              <a:rPr lang="en-US" sz="2400" dirty="0"/>
+              <a:t>    </a:t>
+            </a:r>
+            <a:r>
+              <a:rPr lang="en-US" sz="2400" dirty="0" err="1"/>
+              <a:t>val</a:t>
+            </a:r>
+            <a:r>
+              <a:rPr lang="en-US" sz="2400" dirty="0"/>
+              <a:t> </a:t>
+            </a:r>
+            <a:r>
+              <a:rPr lang="en-US" sz="2400" dirty="0" err="1"/>
+              <a:t>rdd</a:t>
+            </a:r>
+            <a:r>
+              <a:rPr lang="en-US" sz="2400" dirty="0"/>
+              <a:t> = </a:t>
+            </a:r>
+            <a:r>
+              <a:rPr lang="en-US" sz="2400" dirty="0" err="1"/>
+              <a:t>sqlContext</a:t>
+            </a:r>
+            <a:endParaRPr lang="en-US" sz="2400" dirty="0"/>
+          </a:p>
+          <a:p>
+            <a:r>
+              <a:rPr lang="en-US" sz="2400" dirty="0"/>
+              <a:t>           .</a:t>
+            </a:r>
+            <a:r>
+              <a:rPr lang="en-US" sz="2400" dirty="0" err="1"/>
+              <a:t>sparkContext</a:t>
+            </a:r>
+            <a:endParaRPr lang="en-US" sz="2400" dirty="0"/>
+          </a:p>
+          <a:p>
+            <a:r>
+              <a:rPr lang="en-US" sz="2400" dirty="0"/>
+              <a:t>           .parallelize(data)</a:t>
+            </a:r>
+          </a:p>
+          <a:p>
+            <a:r>
+              <a:rPr lang="en-US" sz="2400" dirty="0"/>
+              <a:t>           .map { case (v, l) =&gt; </a:t>
+            </a:r>
+            <a:r>
+              <a:rPr lang="en-US" sz="2400" dirty="0" err="1"/>
+              <a:t>InternalRow</a:t>
+            </a:r>
+            <a:r>
+              <a:rPr lang="en-US" sz="2400" dirty="0"/>
+              <a:t>( v, </a:t>
+            </a:r>
+            <a:r>
+              <a:rPr lang="en-US" sz="2400" dirty="0" err="1"/>
+              <a:t>l.toLong</a:t>
+            </a:r>
+            <a:r>
+              <a:rPr lang="en-US" sz="2400" dirty="0"/>
+              <a:t>) }</a:t>
+            </a:r>
+          </a:p>
+          <a:p>
+            <a:r>
+              <a:rPr lang="en-US" sz="2400" dirty="0" smtClean="0"/>
+              <a:t>     </a:t>
+            </a:r>
+            <a:r>
+              <a:rPr lang="en-US" sz="2400" dirty="0" err="1"/>
+              <a:t>sqlContext.sparkSession.internalCreateDataFrame</a:t>
+            </a:r>
+            <a:r>
+              <a:rPr lang="en-US" sz="2400" dirty="0"/>
+              <a:t>(</a:t>
+            </a:r>
+            <a:r>
+              <a:rPr lang="en-US" sz="2400" dirty="0" err="1"/>
+              <a:t>rdd</a:t>
+            </a:r>
+            <a:r>
+              <a:rPr lang="en-US" sz="2400" dirty="0"/>
+              <a:t>, </a:t>
+            </a:r>
+            <a:r>
+              <a:rPr lang="en-US" sz="2400" dirty="0" err="1"/>
+              <a:t>schema,isStreaming</a:t>
+            </a:r>
+            <a:r>
+              <a:rPr lang="en-US" sz="2400" dirty="0"/>
+              <a:t> = true)</a:t>
+            </a:r>
+          </a:p>
+          <a:p>
+            <a:r>
+              <a:rPr lang="en-US" sz="2400" dirty="0" smtClean="0"/>
+              <a:t>  </a:t>
+            </a:r>
+            <a:r>
+              <a:rPr lang="en-US" sz="2400" dirty="0"/>
+              <a:t>}</a:t>
+            </a:r>
+          </a:p>
+          <a:p>
+            <a:r>
+              <a:rPr lang="en-US" sz="2400" dirty="0" smtClean="0"/>
+              <a:t>  </a:t>
+            </a:r>
+            <a:r>
+              <a:rPr lang="en-US" sz="2400" dirty="0"/>
+              <a:t>override </a:t>
+            </a:r>
+            <a:r>
+              <a:rPr lang="en-US" sz="2400" dirty="0" err="1"/>
+              <a:t>def</a:t>
+            </a:r>
+            <a:r>
+              <a:rPr lang="en-US" sz="2400" dirty="0"/>
+              <a:t> stop(): Unit = {}</a:t>
+            </a:r>
+          </a:p>
+          <a:p>
+            <a:r>
+              <a:rPr lang="en-US" sz="2400" dirty="0"/>
+              <a:t>}</a:t>
+            </a:r>
+          </a:p>
+          <a:p>
+            <a:r>
+              <a:rPr lang="en-US" sz="2400" dirty="0"/>
+              <a:t>object </a:t>
+            </a:r>
+            <a:r>
+              <a:rPr lang="en-US" sz="2400" dirty="0" err="1"/>
+              <a:t>RandomInt</a:t>
+            </a:r>
+            <a:r>
+              <a:rPr lang="en-US" sz="2400" dirty="0"/>
+              <a:t> {</a:t>
+            </a:r>
+          </a:p>
+          <a:p>
+            <a:r>
+              <a:rPr lang="en-US" sz="2400" dirty="0"/>
+              <a:t>  lazy </a:t>
+            </a:r>
+            <a:r>
+              <a:rPr lang="en-US" sz="2400" dirty="0" err="1"/>
+              <a:t>val</a:t>
+            </a:r>
+            <a:r>
+              <a:rPr lang="en-US" sz="2400" dirty="0"/>
+              <a:t> schema = </a:t>
+            </a:r>
+            <a:r>
+              <a:rPr lang="en-US" sz="2400" dirty="0" err="1"/>
+              <a:t>StructType</a:t>
+            </a:r>
+            <a:r>
+              <a:rPr lang="en-US" sz="2400" dirty="0"/>
+              <a:t>(List(</a:t>
+            </a:r>
+            <a:r>
+              <a:rPr lang="en-US" sz="2400" dirty="0" err="1"/>
+              <a:t>StructField</a:t>
+            </a:r>
+            <a:r>
+              <a:rPr lang="en-US" sz="2400" dirty="0"/>
+              <a:t>("value", </a:t>
+            </a:r>
+            <a:r>
+              <a:rPr lang="en-US" sz="2400" dirty="0" err="1"/>
+              <a:t>IntegerType</a:t>
+            </a:r>
+            <a:r>
+              <a:rPr lang="en-US" sz="2400" dirty="0"/>
+              <a:t>), </a:t>
+            </a:r>
+            <a:r>
+              <a:rPr lang="en-US" sz="2400" dirty="0" err="1"/>
+              <a:t>StructField</a:t>
+            </a:r>
+            <a:r>
+              <a:rPr lang="en-US" sz="2400" dirty="0"/>
+              <a:t>("</a:t>
+            </a:r>
+            <a:r>
+              <a:rPr lang="en-US" sz="2400" dirty="0" err="1"/>
+              <a:t>ts</a:t>
+            </a:r>
+            <a:r>
+              <a:rPr lang="en-US" sz="2400" dirty="0"/>
+              <a:t>", </a:t>
+            </a:r>
+            <a:r>
+              <a:rPr lang="en-US" sz="2400" dirty="0" err="1"/>
+              <a:t>LongType</a:t>
+            </a:r>
+            <a:r>
+              <a:rPr lang="en-US" sz="2400" dirty="0"/>
+              <a:t>)))</a:t>
+            </a:r>
+          </a:p>
+          <a:p>
+            <a:r>
+              <a:rPr lang="en-US" sz="2400" dirty="0"/>
+              <a:t>}</a:t>
+            </a:r>
+            <a:endParaRPr lang="ru-RU" sz="2400" dirty="0"/>
+          </a:p>
+        </p:txBody>
+      </p:sp>
+      <p:sp>
+        <p:nvSpPr>
+          <p:cNvPr id="7" name="Заголовок 1"/>
+          <p:cNvSpPr>
+            <a:spLocks noGrp="1"/>
+          </p:cNvSpPr>
+          <p:nvPr>
+            <p:ph type="title"/>
+          </p:nvPr>
+        </p:nvSpPr>
+        <p:spPr>
+          <a:xfrm>
+            <a:off x="838200" y="0"/>
+            <a:ext cx="10515600" cy="1325563"/>
+          </a:xfrm>
+        </p:spPr>
+        <p:txBody>
+          <a:bodyPr/>
+          <a:lstStyle/>
+          <a:p>
+            <a:pPr algn="ctr"/>
+            <a:r>
+              <a:rPr lang="en-US" dirty="0" err="1" smtClean="0"/>
+              <a:t>RandomInt</a:t>
+            </a:r>
+            <a:endParaRPr lang="ru-RU" dirty="0"/>
+          </a:p>
+        </p:txBody>
+      </p:sp>
+    </p:spTree>
+    <p:extLst>
+      <p:ext uri="{BB962C8B-B14F-4D97-AF65-F5344CB8AC3E}">
+        <p14:creationId xmlns:p14="http://schemas.microsoft.com/office/powerpoint/2010/main" val="1918022555"/>
+      </p:ext>
+    </p:extLst>
+  </p:cSld>
+  <p:clrMapOvr>
+    <a:masterClrMapping/>
+  </p:clrMapOvr>
+  <p:timing>
+    <p:tnLst>
+      <p:par>
+        <p:cTn id="1" dur="indefinite" restart="never" nodeType="tmRoot"/>
+      </p:par>
+    </p:tnLst>
+  </p:timing>
+</p:sld>
+</file>
+
+<file path=ppt/slides/slide14.xml><?xml version="1.0" encoding="utf-8"?>
+<p:sld xmlns:a="http://schemas.openxmlformats.org/drawingml/2006/main" xmlns:r="http://schemas.openxmlformats.org/officeDocument/2006/relationships" xmlns:p="http://schemas.openxmlformats.org/presentationml/2006/main">
+  <p:cSld>
+    <p:spTree>
+      <p:nvGrpSpPr>
+        <p:cNvPr id="1" name=""/>
+        <p:cNvGrpSpPr/>
+        <p:nvPr/>
+      </p:nvGrpSpPr>
+      <p:grpSpPr>
+        <a:xfrm>
+          <a:off x="0" y="0"/>
+          <a:ext cx="0" cy="0"/>
+          <a:chOff x="0" y="0"/>
+          <a:chExt cx="0" cy="0"/>
+        </a:xfrm>
+      </p:grpSpPr>
+      <p:sp>
+        <p:nvSpPr>
+          <p:cNvPr id="2" name="Заголовок 1"/>
+          <p:cNvSpPr>
+            <a:spLocks noGrp="1"/>
+          </p:cNvSpPr>
+          <p:nvPr>
+            <p:ph type="title"/>
+          </p:nvPr>
+        </p:nvSpPr>
         <p:spPr/>
         <p:txBody>
           <a:bodyPr/>
@@ -3853,7 +4719,7 @@
 </p:sld>
 </file>
 
-<file path=ppt/slides/slide12.xml><?xml version="1.0" encoding="utf-8"?>
+<file path=ppt/slides/slide15.xml><?xml version="1.0" encoding="utf-8"?>
 <p:sld xmlns:a="http://schemas.openxmlformats.org/drawingml/2006/main" xmlns:r="http://schemas.openxmlformats.org/officeDocument/2006/relationships" xmlns:p="http://schemas.openxmlformats.org/presentationml/2006/main">
   <p:cSld>
     <p:spTree>
@@ -4095,15 +4961,7 @@
                 <a:ea typeface="+mj-ea"/>
                 <a:cs typeface="+mj-cs"/>
               </a:rPr>
-              <a:t>Lets implement simple stream </a:t>
-            </a:r>
-            <a:r>
-              <a:rPr lang="en-US" sz="4400" b="1" dirty="0" smtClean="0">
-                <a:latin typeface="+mj-lt"/>
-                <a:ea typeface="+mj-ea"/>
-                <a:cs typeface="+mj-cs"/>
-              </a:rPr>
-              <a:t>source</a:t>
+              <a:t>Lets implement simple stream source</a:t>
             </a:r>
           </a:p>
           <a:p>
@@ -4136,8 +4994,8 @@
         </p:nvSpPr>
         <p:spPr>
           <a:xfrm>
-            <a:off x="3711190" y="2128468"/>
-            <a:ext cx="6055807" cy="3970318"/>
+            <a:off x="2471896" y="2128468"/>
+            <a:ext cx="7295102" cy="3970318"/>
           </a:xfrm>
           <a:prstGeom prst="rect">
             <a:avLst/>
@@ -4183,8 +5041,8 @@
               <a:t>format("</a:t>
             </a:r>
             <a:r>
-              <a:rPr lang="en-US" sz="2800" b="1" dirty="0" err="1"/>
-              <a:t>streams.CustomSource</a:t>
+              <a:rPr lang="en-US" sz="2800" b="1" dirty="0" err="1" smtClean="0"/>
+              <a:t>streams.CustomStreamSource</a:t>
             </a:r>
             <a:r>
               <a:rPr lang="en-US" sz="2800" b="1" dirty="0"/>
@@ -4322,397 +5180,189 @@
       </p:grpSpPr>
       <p:sp>
         <p:nvSpPr>
-          <p:cNvPr id="2" name="Заголовок 1"/>
-          <p:cNvSpPr>
-            <a:spLocks noGrp="1"/>
-          </p:cNvSpPr>
-          <p:nvPr>
-            <p:ph type="title"/>
-          </p:nvPr>
+          <p:cNvPr id="2" name="Прямоугольник 1"/>
+          <p:cNvSpPr/>
+          <p:nvPr/>
         </p:nvSpPr>
         <p:spPr>
           <a:xfrm>
-            <a:off x="757813" y="0"/>
-            <a:ext cx="10515600" cy="1325563"/>
-          </a:xfrm>
-        </p:spPr>
-        <p:txBody>
-          <a:bodyPr/>
-          <a:lstStyle/>
-          <a:p>
-            <a:pPr algn="ctr"/>
-            <a:r>
-              <a:rPr lang="en-US" dirty="0" smtClean="0"/>
-              <a:t>Step 1</a:t>
-            </a:r>
-            <a:endParaRPr lang="ru-RU" dirty="0"/>
-          </a:p>
-        </p:txBody>
-      </p:sp>
-      <p:sp>
-        <p:nvSpPr>
-          <p:cNvPr id="3" name="Объект 2"/>
-          <p:cNvSpPr>
-            <a:spLocks noGrp="1"/>
-          </p:cNvSpPr>
-          <p:nvPr>
-            <p:ph idx="1"/>
-          </p:nvPr>
-        </p:nvSpPr>
-        <p:spPr>
-          <a:xfrm>
-            <a:off x="526281" y="1275226"/>
-            <a:ext cx="11139435" cy="1399896"/>
-          </a:xfrm>
-        </p:spPr>
-        <p:txBody>
-          <a:bodyPr/>
-          <a:lstStyle/>
-          <a:p>
-            <a:r>
-              <a:rPr lang="en-US" dirty="0" smtClean="0"/>
-              <a:t>Need to </a:t>
-            </a:r>
-            <a:r>
-              <a:rPr lang="en-US" dirty="0"/>
-              <a:t>define </a:t>
-            </a:r>
-            <a:r>
-              <a:rPr lang="en-US" dirty="0" smtClean="0"/>
-              <a:t>class </a:t>
-            </a:r>
-          </a:p>
-          <a:p>
-            <a:pPr marL="0" indent="0">
-              <a:buNone/>
-            </a:pPr>
-            <a:r>
-              <a:rPr lang="en-US" dirty="0"/>
-              <a:t> </a:t>
-            </a:r>
-            <a:r>
-              <a:rPr lang="en-US" dirty="0" smtClean="0"/>
-              <a:t>     which extends </a:t>
-            </a:r>
-            <a:r>
-              <a:rPr lang="en-US" dirty="0"/>
-              <a:t>of </a:t>
-            </a:r>
-            <a:r>
-              <a:rPr lang="en-US" dirty="0" err="1" smtClean="0"/>
-              <a:t>StreamSourceProvider</a:t>
-            </a:r>
-            <a:r>
-              <a:rPr lang="en-US" dirty="0" smtClean="0"/>
-              <a:t> and </a:t>
-            </a:r>
-            <a:r>
-              <a:rPr lang="en-US" dirty="0" err="1" smtClean="0"/>
-              <a:t>DataSourceRegister</a:t>
-            </a:r>
-            <a:r>
-              <a:rPr lang="en-US" dirty="0" smtClean="0"/>
-              <a:t> </a:t>
-            </a:r>
-            <a:endParaRPr lang="ru-RU" dirty="0"/>
-          </a:p>
-        </p:txBody>
-      </p:sp>
-      <p:sp>
-        <p:nvSpPr>
-          <p:cNvPr id="4" name="Прямоугольник 3"/>
-          <p:cNvSpPr/>
-          <p:nvPr/>
-        </p:nvSpPr>
-        <p:spPr>
-          <a:xfrm>
-            <a:off x="415329" y="2675122"/>
-            <a:ext cx="11361337" cy="3970318"/>
+            <a:off x="1108668" y="719521"/>
+            <a:ext cx="6096000" cy="2585323"/>
           </a:xfrm>
           <a:prstGeom prst="rect">
             <a:avLst/>
           </a:prstGeom>
         </p:spPr>
         <p:txBody>
-          <a:bodyPr wrap="square">
+          <a:bodyPr>
             <a:spAutoFit/>
           </a:bodyPr>
           <a:lstStyle/>
           <a:p>
             <a:r>
               <a:rPr lang="en-US" dirty="0"/>
-              <a:t>class </a:t>
-            </a:r>
-            <a:r>
-              <a:rPr lang="en-US" b="1" dirty="0" err="1"/>
-              <a:t>CustomSource</a:t>
-            </a:r>
-            <a:r>
-              <a:rPr lang="en-US" b="1" dirty="0"/>
-              <a:t>  extends </a:t>
-            </a:r>
-            <a:r>
-              <a:rPr lang="en-US" b="1" dirty="0" err="1"/>
-              <a:t>StreamSourceProvider</a:t>
-            </a:r>
-            <a:r>
-              <a:rPr lang="en-US" b="1" dirty="0"/>
-              <a:t> with </a:t>
-            </a:r>
-            <a:r>
-              <a:rPr lang="en-US" b="1" dirty="0" err="1"/>
-              <a:t>DataSourceRegister</a:t>
-            </a:r>
+              <a:t>-------------------------------------------</a:t>
+            </a:r>
+          </a:p>
+          <a:p>
             <a:r>
               <a:rPr lang="en-US" dirty="0"/>
-              <a:t>  {</a:t>
-            </a:r>
-          </a:p>
-          <a:p>
-            <a:endParaRPr lang="en-US" dirty="0"/>
+              <a:t>Batch: 1</a:t>
+            </a:r>
           </a:p>
           <a:p>
             <a:r>
               <a:rPr lang="en-US" dirty="0"/>
-              <a:t>  override </a:t>
+              <a:t>-------------------------------------------</a:t>
+            </a:r>
+          </a:p>
+          <a:p>
+            <a:r>
+              <a:rPr lang="en-US" dirty="0"/>
+              <a:t>+-----+---+</a:t>
+            </a:r>
+          </a:p>
+          <a:p>
+            <a:r>
+              <a:rPr lang="en-US" dirty="0"/>
+              <a:t>|value| </a:t>
             </a:r>
             <a:r>
               <a:rPr lang="en-US" dirty="0" err="1"/>
-              <a:t>def</a:t>
+              <a:t>ts</a:t>
             </a:r>
             <a:r>
               <a:rPr lang="en-US" dirty="0"/>
-              <a:t> </a:t>
-            </a:r>
-            <a:r>
-              <a:rPr lang="en-US" dirty="0" err="1"/>
-              <a:t>sourceSchema</a:t>
-            </a:r>
+              <a:t>|</a:t>
+            </a:r>
+          </a:p>
+          <a:p>
             <a:r>
               <a:rPr lang="en-US" dirty="0"/>
-              <a:t>(</a:t>
-            </a:r>
-            <a:r>
-              <a:rPr lang="en-US" dirty="0" err="1"/>
-              <a:t>sqlContext</a:t>
-            </a:r>
+              <a:t>+-----+---+</a:t>
+            </a:r>
+          </a:p>
+          <a:p>
             <a:r>
               <a:rPr lang="en-US" dirty="0"/>
-              <a:t>: </a:t>
-            </a:r>
-            <a:r>
-              <a:rPr lang="en-US" dirty="0" err="1"/>
-              <a:t>SQLContext</a:t>
-            </a:r>
+              <a:t>|    1|  1|</a:t>
+            </a:r>
+          </a:p>
+          <a:p>
             <a:r>
               <a:rPr lang="en-US" dirty="0"/>
-              <a:t>, schema: Option[</a:t>
-            </a:r>
-            <a:r>
-              <a:rPr lang="en-US" dirty="0" err="1"/>
-              <a:t>StructType</a:t>
-            </a:r>
+              <a:t>|    2|  2|</a:t>
+            </a:r>
+          </a:p>
+          <a:p>
             <a:r>
               <a:rPr lang="en-US" dirty="0"/>
-              <a:t>], </a:t>
-            </a:r>
-            <a:r>
-              <a:rPr lang="en-US" dirty="0" err="1"/>
-              <a:t>providerName</a:t>
-            </a:r>
-            <a:r>
-              <a:rPr lang="en-US" dirty="0"/>
-              <a:t>: String, parameters: Map[String, String]): (String, </a:t>
-            </a:r>
-            <a:r>
-              <a:rPr lang="en-US" dirty="0" err="1"/>
-              <a:t>StructType</a:t>
-            </a:r>
-            <a:r>
-              <a:rPr lang="en-US" dirty="0"/>
-              <a:t>) = {</a:t>
-            </a:r>
-          </a:p>
-          <a:p>
-            <a:r>
-              <a:rPr lang="en-US" dirty="0"/>
-              <a:t>    (</a:t>
-            </a:r>
-            <a:r>
-              <a:rPr lang="en-US" dirty="0" err="1"/>
-              <a:t>shortName</a:t>
-            </a:r>
-            <a:r>
-              <a:rPr lang="en-US" dirty="0"/>
-              <a:t>(), </a:t>
-            </a:r>
-            <a:r>
-              <a:rPr lang="en-US" dirty="0" err="1"/>
-              <a:t>RandomInt.schema</a:t>
-            </a:r>
-            <a:r>
-              <a:rPr lang="en-US" dirty="0"/>
-              <a:t>)</a:t>
-            </a:r>
-          </a:p>
-          <a:p>
-            <a:r>
-              <a:rPr lang="en-US" dirty="0"/>
-              <a:t>  }</a:t>
-            </a:r>
-          </a:p>
-          <a:p>
-            <a:endParaRPr lang="en-US" dirty="0"/>
-          </a:p>
-          <a:p>
-            <a:r>
-              <a:rPr lang="en-US" dirty="0"/>
-              <a:t>  override </a:t>
-            </a:r>
-            <a:r>
-              <a:rPr lang="en-US" dirty="0" err="1"/>
-              <a:t>def</a:t>
-            </a:r>
-            <a:r>
-              <a:rPr lang="en-US" dirty="0"/>
-              <a:t> </a:t>
-            </a:r>
-            <a:r>
-              <a:rPr lang="en-US" dirty="0" err="1"/>
-              <a:t>createSource</a:t>
-            </a:r>
-            <a:r>
-              <a:rPr lang="en-US" dirty="0"/>
-              <a:t>(</a:t>
-            </a:r>
-            <a:r>
-              <a:rPr lang="en-US" dirty="0" err="1"/>
-              <a:t>sqlContext</a:t>
-            </a:r>
-            <a:r>
-              <a:rPr lang="en-US" dirty="0"/>
-              <a:t>: </a:t>
-            </a:r>
-            <a:r>
-              <a:rPr lang="en-US" dirty="0" err="1"/>
-              <a:t>SQLContext</a:t>
-            </a:r>
-            <a:r>
-              <a:rPr lang="en-US" dirty="0"/>
-              <a:t>, </a:t>
-            </a:r>
-            <a:r>
-              <a:rPr lang="en-US" dirty="0" err="1"/>
-              <a:t>metadataPath</a:t>
-            </a:r>
-            <a:r>
-              <a:rPr lang="en-US" dirty="0"/>
-              <a:t>: String, schema: Option[</a:t>
-            </a:r>
-            <a:r>
-              <a:rPr lang="en-US" dirty="0" err="1"/>
-              <a:t>StructType</a:t>
-            </a:r>
-            <a:r>
-              <a:rPr lang="en-US" dirty="0"/>
-              <a:t>], </a:t>
-            </a:r>
-            <a:r>
-              <a:rPr lang="en-US" dirty="0" err="1"/>
-              <a:t>providerName</a:t>
-            </a:r>
-            <a:r>
-              <a:rPr lang="en-US" dirty="0"/>
-              <a:t>: String, parameters: Map[String, String]): Source = {</a:t>
-            </a:r>
-          </a:p>
-          <a:p>
-            <a:r>
-              <a:rPr lang="en-US" dirty="0"/>
-              <a:t>    new </a:t>
-            </a:r>
-            <a:r>
-              <a:rPr lang="en-US" dirty="0" err="1"/>
-              <a:t>RandomInt</a:t>
-            </a:r>
-            <a:r>
-              <a:rPr lang="en-US" dirty="0"/>
-              <a:t>(</a:t>
-            </a:r>
-            <a:r>
-              <a:rPr lang="en-US" dirty="0" err="1"/>
-              <a:t>sqlContext</a:t>
-            </a:r>
-            <a:r>
-              <a:rPr lang="en-US" dirty="0"/>
-              <a:t>)</a:t>
-            </a:r>
-          </a:p>
-          <a:p>
-            <a:r>
-              <a:rPr lang="en-US" dirty="0"/>
-              <a:t>  }</a:t>
-            </a:r>
-          </a:p>
-          <a:p>
-            <a:endParaRPr lang="en-US" dirty="0"/>
-          </a:p>
-          <a:p>
-            <a:r>
-              <a:rPr lang="en-US" dirty="0"/>
-              <a:t>  override </a:t>
-            </a:r>
-            <a:r>
-              <a:rPr lang="en-US" dirty="0" err="1"/>
-              <a:t>def</a:t>
-            </a:r>
-            <a:r>
-              <a:rPr lang="en-US" dirty="0"/>
-              <a:t> </a:t>
-            </a:r>
-            <a:r>
-              <a:rPr lang="en-US" dirty="0" err="1"/>
-              <a:t>shortName</a:t>
-            </a:r>
-            <a:r>
-              <a:rPr lang="en-US" dirty="0"/>
-              <a:t>(): String = "Random </a:t>
-            </a:r>
-            <a:r>
-              <a:rPr lang="en-US" dirty="0" err="1"/>
-              <a:t>Int</a:t>
-            </a:r>
-            <a:r>
-              <a:rPr lang="en-US" dirty="0"/>
-              <a:t>"</a:t>
-            </a:r>
-          </a:p>
-          <a:p>
-            <a:r>
-              <a:rPr lang="en-US" dirty="0"/>
-              <a:t>}</a:t>
+              <a:t>+-----+---+</a:t>
             </a:r>
             <a:endParaRPr lang="ru-RU" dirty="0"/>
+          </a:p>
+        </p:txBody>
+      </p:sp>
+      <p:sp>
+        <p:nvSpPr>
+          <p:cNvPr id="3" name="Прямоугольник 2"/>
+          <p:cNvSpPr/>
+          <p:nvPr/>
+        </p:nvSpPr>
+        <p:spPr>
+          <a:xfrm>
+            <a:off x="1108668" y="3631365"/>
+            <a:ext cx="6096000" cy="2308324"/>
+          </a:xfrm>
+          <a:prstGeom prst="rect">
+            <a:avLst/>
+          </a:prstGeom>
+        </p:spPr>
+        <p:txBody>
+          <a:bodyPr>
+            <a:spAutoFit/>
+          </a:bodyPr>
+          <a:lstStyle/>
+          <a:p>
+            <a:r>
+              <a:rPr lang="ru-RU" dirty="0" err="1"/>
+              <a:t>Batch</a:t>
+            </a:r>
+            <a:r>
+              <a:rPr lang="ru-RU" dirty="0"/>
+              <a:t>: 4</a:t>
+            </a:r>
+          </a:p>
+          <a:p>
+            <a:r>
+              <a:rPr lang="ru-RU" dirty="0"/>
+              <a:t>-------------------------------------------</a:t>
+            </a:r>
+          </a:p>
+          <a:p>
+            <a:r>
+              <a:rPr lang="ru-RU" dirty="0"/>
+              <a:t>+-----+---+</a:t>
+            </a:r>
+          </a:p>
+          <a:p>
+            <a:r>
+              <a:rPr lang="ru-RU" dirty="0"/>
+              <a:t>|</a:t>
+            </a:r>
+            <a:r>
+              <a:rPr lang="ru-RU" dirty="0" err="1"/>
+              <a:t>value</a:t>
+            </a:r>
+            <a:r>
+              <a:rPr lang="ru-RU" dirty="0"/>
+              <a:t>| </a:t>
+            </a:r>
+            <a:r>
+              <a:rPr lang="ru-RU" dirty="0" err="1"/>
+              <a:t>ts</a:t>
+            </a:r>
+            <a:r>
+              <a:rPr lang="ru-RU" dirty="0"/>
+              <a:t>|</a:t>
+            </a:r>
+          </a:p>
+          <a:p>
+            <a:r>
+              <a:rPr lang="ru-RU" dirty="0"/>
+              <a:t>+-----+---+</a:t>
+            </a:r>
+          </a:p>
+          <a:p>
+            <a:r>
+              <a:rPr lang="ru-RU" dirty="0"/>
+              <a:t>|    1|  1|</a:t>
+            </a:r>
+          </a:p>
+          <a:p>
+            <a:r>
+              <a:rPr lang="ru-RU" dirty="0"/>
+              <a:t>|    2|  2|</a:t>
+            </a:r>
+          </a:p>
+          <a:p>
+            <a:r>
+              <a:rPr lang="ru-RU" dirty="0"/>
+              <a:t>+-----+---+</a:t>
+            </a:r>
           </a:p>
         </p:txBody>
       </p:sp>
     </p:spTree>
     <p:extLst>
       <p:ext uri="{BB962C8B-B14F-4D97-AF65-F5344CB8AC3E}">
-        <p14:creationId xmlns:p14="http://schemas.microsoft.com/office/powerpoint/2010/main" val="1517519040"/>
+        <p14:creationId xmlns:p14="http://schemas.microsoft.com/office/powerpoint/2010/main" val="2009832682"/>
       </p:ext>
     </p:extLst>
   </p:cSld>
   <p:clrMapOvr>
     <a:masterClrMapping/>
   </p:clrMapOvr>
-  <p:timing>
-    <p:tnLst>
-      <p:par>
-        <p:cTn id="1" dur="indefinite" restart="never" nodeType="tmRoot"/>
-      </p:par>
-    </p:tnLst>
-  </p:timing>
 </p:sld>
 </file>
 
@@ -4745,7 +5395,7 @@
         </p:nvSpPr>
         <p:spPr>
           <a:xfrm>
-            <a:off x="838200" y="0"/>
+            <a:off x="757813" y="0"/>
             <a:ext cx="10515600" cy="1325563"/>
           </a:xfrm>
         </p:spPr>
@@ -4755,8 +5405,8 @@
           <a:p>
             <a:pPr algn="ctr"/>
             <a:r>
-              <a:rPr lang="en-US" dirty="0" err="1"/>
-              <a:t>StreamSourceProvider</a:t>
+              <a:rPr lang="en-US" dirty="0" smtClean="0"/>
+              <a:t>Step 1</a:t>
             </a:r>
             <a:endParaRPr lang="ru-RU" dirty="0"/>
           </a:p>
@@ -4774,26 +5424,58 @@
         </p:nvSpPr>
         <p:spPr>
           <a:xfrm>
-            <a:off x="838200" y="1152385"/>
-            <a:ext cx="10515600" cy="796995"/>
+            <a:off x="526281" y="1275226"/>
+            <a:ext cx="11139435" cy="1399896"/>
           </a:xfrm>
         </p:spPr>
         <p:txBody>
-          <a:bodyPr>
-            <a:normAutofit lnSpcReduction="10000"/>
-          </a:bodyPr>
-          <a:lstStyle/>
+          <a:bodyPr/>
+          <a:lstStyle/>
+          <a:p>
+            <a:r>
+              <a:rPr lang="en-US" dirty="0" smtClean="0"/>
+              <a:t>Need to </a:t>
+            </a:r>
+            <a:r>
+              <a:rPr lang="en-US" dirty="0"/>
+              <a:t>define </a:t>
+            </a:r>
+            <a:r>
+              <a:rPr lang="en-US" dirty="0" smtClean="0"/>
+              <a:t>class </a:t>
+            </a:r>
+          </a:p>
           <a:p>
             <a:pPr marL="0" indent="0">
               <a:buNone/>
             </a:pPr>
             <a:r>
+              <a:rPr lang="en-US" dirty="0"/>
+              <a:t> </a:t>
+            </a:r>
+            <a:r>
               <a:rPr lang="en-US" dirty="0" smtClean="0"/>
-              <a:t>	Implemented </a:t>
+              <a:t>     which extends </a:t>
             </a:r>
             <a:r>
               <a:rPr lang="en-US" dirty="0"/>
-              <a:t>by objects that can produce a streaming `Source` for a specific format or system</a:t>
+              <a:t>of </a:t>
+            </a:r>
+            <a:r>
+              <a:rPr lang="en-US" dirty="0" err="1" smtClean="0"/>
+              <a:t>StreamSourceProvider</a:t>
+            </a:r>
+            <a:r>
+              <a:rPr lang="en-US" dirty="0" smtClean="0"/>
+              <a:t> and </a:t>
+            </a:r>
+            <a:r>
+              <a:rPr lang="en-US" dirty="0" err="1" smtClean="0"/>
+              <a:t>DataSourceRegister</a:t>
+            </a:r>
+            <a:r>
+              <a:rPr lang="en-US" dirty="0" smtClean="0"/>
+              <a:t> </a:t>
             </a:r>
             <a:endParaRPr lang="ru-RU" dirty="0"/>
           </a:p>
@@ -4801,14 +5483,14 @@
       </p:sp>
       <p:sp>
         <p:nvSpPr>
-          <p:cNvPr id="7" name="Прямоугольник 6"/>
+          <p:cNvPr id="4" name="Прямоугольник 3"/>
           <p:cNvSpPr/>
           <p:nvPr/>
         </p:nvSpPr>
         <p:spPr>
           <a:xfrm>
-            <a:off x="938683" y="2028439"/>
-            <a:ext cx="10058400" cy="4708981"/>
+            <a:off x="415329" y="2675122"/>
+            <a:ext cx="11361337" cy="3970318"/>
           </a:xfrm>
           <a:prstGeom prst="rect">
             <a:avLst/>
@@ -4821,215 +5503,294 @@
           <a:lstStyle/>
           <a:p>
             <a:r>
-              <a:rPr lang="en-US" sz="2000" dirty="0"/>
-              <a:t>trait </a:t>
-            </a:r>
-            <a:r>
-              <a:rPr lang="en-US" sz="2000" dirty="0" err="1"/>
+              <a:rPr lang="en-US" dirty="0"/>
+              <a:t>class </a:t>
+            </a:r>
+            <a:r>
+              <a:rPr lang="en-US" b="1" dirty="0" err="1" smtClean="0"/>
+              <a:t>Custom</a:t>
+            </a:r>
+            <a:r>
+              <a:rPr lang="en-US" b="1" dirty="0" err="1" smtClean="0"/>
+              <a:t>Stream</a:t>
+            </a:r>
+            <a:r>
+              <a:rPr lang="en-US" b="1" dirty="0" err="1" smtClean="0"/>
+              <a:t>Source</a:t>
+            </a:r>
+            <a:r>
+              <a:rPr lang="en-US" b="1" dirty="0" smtClean="0"/>
+              <a:t>  </a:t>
+            </a:r>
+            <a:r>
+              <a:rPr lang="en-US" b="1" dirty="0"/>
+              <a:t>extends </a:t>
+            </a:r>
+            <a:r>
+              <a:rPr lang="en-US" b="1" dirty="0" err="1"/>
               <a:t>StreamSourceProvider</a:t>
             </a:r>
             <a:r>
-              <a:rPr lang="en-US" sz="2000" dirty="0"/>
-              <a:t> {</a:t>
-            </a:r>
-          </a:p>
-          <a:p>
-            <a:endParaRPr lang="en-US" sz="2000" dirty="0" smtClean="0"/>
-          </a:p>
-          <a:p>
-            <a:r>
-              <a:rPr lang="en-US" sz="2000" dirty="0" err="1" smtClean="0"/>
+              <a:rPr lang="en-US" b="1" dirty="0"/>
+              <a:t> with </a:t>
+            </a:r>
+            <a:r>
+              <a:rPr lang="en-US" b="1" dirty="0" err="1"/>
+              <a:t>DataSourceRegister</a:t>
+            </a:r>
+            <a:r>
+              <a:rPr lang="en-US" dirty="0"/>
+              <a:t>  {</a:t>
+            </a:r>
+          </a:p>
+          <a:p>
+            <a:endParaRPr lang="en-US" dirty="0"/>
+          </a:p>
+          <a:p>
+            <a:r>
+              <a:rPr lang="en-US" dirty="0"/>
+              <a:t>  override </a:t>
+            </a:r>
+            <a:r>
+              <a:rPr lang="en-US" dirty="0" err="1"/>
               <a:t>def</a:t>
             </a:r>
             <a:r>
-              <a:rPr lang="en-US" sz="2000" dirty="0" smtClean="0"/>
+              <a:rPr lang="en-US" dirty="0"/>
               <a:t> </a:t>
             </a:r>
             <a:r>
-              <a:rPr lang="en-US" sz="2000" b="1" dirty="0" err="1"/>
+              <a:rPr lang="en-US" b="1" dirty="0" err="1" smtClean="0"/>
               <a:t>sourceSchema</a:t>
             </a:r>
             <a:r>
-              <a:rPr lang="en-US" sz="2000" dirty="0"/>
+              <a:rPr lang="en-US" dirty="0" smtClean="0"/>
               <a:t>(</a:t>
             </a:r>
-          </a:p>
-          <a:p>
-            <a:r>
-              <a:rPr lang="en-US" sz="2000" dirty="0"/>
-              <a:t>      </a:t>
-            </a:r>
-            <a:r>
-              <a:rPr lang="en-US" sz="2000" dirty="0" err="1"/>
+            <a:r>
+              <a:rPr lang="en-US" dirty="0" err="1" smtClean="0"/>
               <a:t>sqlContext</a:t>
             </a:r>
             <a:r>
-              <a:rPr lang="en-US" sz="2000" dirty="0"/>
+              <a:rPr lang="en-US" dirty="0" smtClean="0"/>
               <a:t>: </a:t>
             </a:r>
             <a:r>
-              <a:rPr lang="en-US" sz="2000" dirty="0" err="1"/>
+              <a:rPr lang="en-US" dirty="0" err="1"/>
               <a:t>SQLContext</a:t>
             </a:r>
             <a:r>
-              <a:rPr lang="en-US" sz="2000" dirty="0"/>
-              <a:t>,</a:t>
-            </a:r>
-          </a:p>
-          <a:p>
-            <a:r>
-              <a:rPr lang="en-US" sz="2000" dirty="0"/>
-              <a:t>      schema: Option[</a:t>
-            </a:r>
-            <a:r>
-              <a:rPr lang="en-US" sz="2000" dirty="0" err="1"/>
+              <a:rPr lang="en-US" dirty="0"/>
+              <a:t>, schema: Option[</a:t>
+            </a:r>
+            <a:r>
+              <a:rPr lang="en-US" dirty="0" err="1"/>
               <a:t>StructType</a:t>
             </a:r>
             <a:r>
-              <a:rPr lang="en-US" sz="2000" dirty="0"/>
-              <a:t>],</a:t>
-            </a:r>
-          </a:p>
-          <a:p>
-            <a:r>
-              <a:rPr lang="en-US" sz="2000" dirty="0"/>
-              <a:t>      </a:t>
-            </a:r>
-            <a:r>
-              <a:rPr lang="en-US" sz="2000" dirty="0" err="1"/>
+              <a:rPr lang="en-US" dirty="0"/>
+              <a:t>], </a:t>
+            </a:r>
+            <a:r>
+              <a:rPr lang="en-US" dirty="0" err="1"/>
               <a:t>providerName</a:t>
             </a:r>
             <a:r>
-              <a:rPr lang="en-US" sz="2000" dirty="0"/>
-              <a:t>: String,</a:t>
-            </a:r>
-          </a:p>
-          <a:p>
-            <a:r>
-              <a:rPr lang="en-US" sz="2000" dirty="0"/>
-              <a:t>      parameters: Map[String, String]): </a:t>
-            </a:r>
-            <a:r>
-              <a:rPr lang="en-US" sz="2000" b="1" dirty="0"/>
-              <a:t>(String, </a:t>
-            </a:r>
-            <a:r>
-              <a:rPr lang="en-US" sz="2000" b="1" dirty="0" err="1"/>
+              <a:rPr lang="en-US" dirty="0"/>
+              <a:t>: String, parameters: Map[String, String]): (</a:t>
+            </a:r>
+            <a:r>
+              <a:rPr lang="en-US" b="1" dirty="0"/>
+              <a:t>String</a:t>
+            </a:r>
+            <a:r>
+              <a:rPr lang="en-US" dirty="0"/>
+              <a:t>, </a:t>
+            </a:r>
+            <a:r>
+              <a:rPr lang="en-US" b="1" dirty="0" err="1" smtClean="0"/>
               <a:t>StructType</a:t>
             </a:r>
             <a:r>
-              <a:rPr lang="en-US" sz="2000" b="1" dirty="0"/>
+              <a:rPr lang="en-US" dirty="0"/>
+              <a:t>) = {</a:t>
+            </a:r>
+          </a:p>
+          <a:p>
+            <a:r>
+              <a:rPr lang="en-US" dirty="0"/>
+              <a:t>    (</a:t>
+            </a:r>
+            <a:r>
+              <a:rPr lang="en-US" dirty="0" err="1"/>
+              <a:t>shortName</a:t>
+            </a:r>
+            <a:r>
+              <a:rPr lang="en-US" dirty="0"/>
+              <a:t>(), </a:t>
+            </a:r>
+            <a:r>
+              <a:rPr lang="en-US" dirty="0" err="1"/>
+              <a:t>RandomInt.schema</a:t>
+            </a:r>
+            <a:r>
+              <a:rPr lang="en-US" dirty="0"/>
               <a:t>)</a:t>
             </a:r>
           </a:p>
           <a:p>
-            <a:endParaRPr lang="en-US" sz="2000" dirty="0" smtClean="0"/>
-          </a:p>
-          <a:p>
-            <a:r>
-              <a:rPr lang="en-US" sz="2000" dirty="0" err="1" smtClean="0"/>
+            <a:r>
+              <a:rPr lang="en-US" dirty="0"/>
+              <a:t>  }</a:t>
+            </a:r>
+          </a:p>
+          <a:p>
+            <a:endParaRPr lang="en-US" dirty="0"/>
+          </a:p>
+          <a:p>
+            <a:r>
+              <a:rPr lang="en-US" dirty="0"/>
+              <a:t>  override </a:t>
+            </a:r>
+            <a:r>
+              <a:rPr lang="en-US" dirty="0" err="1"/>
               <a:t>def</a:t>
             </a:r>
             <a:r>
-              <a:rPr lang="en-US" sz="2000" dirty="0" smtClean="0"/>
+              <a:rPr lang="en-US" dirty="0"/>
               <a:t> </a:t>
             </a:r>
             <a:r>
-              <a:rPr lang="en-US" sz="2000" b="1" dirty="0" err="1"/>
+              <a:rPr lang="en-US" b="1" dirty="0" err="1"/>
               <a:t>createSource</a:t>
             </a:r>
             <a:r>
-              <a:rPr lang="en-US" sz="2000" dirty="0"/>
+              <a:rPr lang="en-US" dirty="0"/>
               <a:t>(</a:t>
             </a:r>
-          </a:p>
-          <a:p>
-            <a:r>
-              <a:rPr lang="en-US" sz="2000" dirty="0"/>
-              <a:t>      </a:t>
-            </a:r>
-            <a:r>
-              <a:rPr lang="en-US" sz="2000" dirty="0" err="1"/>
+            <a:r>
+              <a:rPr lang="en-US" dirty="0" err="1"/>
               <a:t>sqlContext</a:t>
             </a:r>
             <a:r>
-              <a:rPr lang="en-US" sz="2000" dirty="0"/>
+              <a:rPr lang="en-US" dirty="0"/>
               <a:t>: </a:t>
             </a:r>
             <a:r>
-              <a:rPr lang="en-US" sz="2000" dirty="0" err="1"/>
+              <a:rPr lang="en-US" dirty="0" err="1"/>
               <a:t>SQLContext</a:t>
             </a:r>
             <a:r>
-              <a:rPr lang="en-US" sz="2000" dirty="0"/>
-              <a:t>,</a:t>
-            </a:r>
-          </a:p>
-          <a:p>
-            <a:r>
-              <a:rPr lang="en-US" sz="2000" dirty="0"/>
-              <a:t>      </a:t>
-            </a:r>
-            <a:r>
-              <a:rPr lang="en-US" sz="2000" dirty="0" err="1"/>
+              <a:rPr lang="en-US" dirty="0"/>
+              <a:t>, </a:t>
+            </a:r>
+            <a:r>
+              <a:rPr lang="en-US" dirty="0" err="1"/>
               <a:t>metadataPath</a:t>
             </a:r>
             <a:r>
-              <a:rPr lang="en-US" sz="2000" dirty="0"/>
-              <a:t>: String,</a:t>
-            </a:r>
-          </a:p>
-          <a:p>
-            <a:r>
-              <a:rPr lang="en-US" sz="2000" dirty="0"/>
-              <a:t>      schema: Option[</a:t>
-            </a:r>
-            <a:r>
-              <a:rPr lang="en-US" sz="2000" dirty="0" err="1"/>
+              <a:rPr lang="en-US" dirty="0"/>
+              <a:t>: String, schema: Option[</a:t>
+            </a:r>
+            <a:r>
+              <a:rPr lang="en-US" dirty="0" err="1"/>
               <a:t>StructType</a:t>
             </a:r>
             <a:r>
-              <a:rPr lang="en-US" sz="2000" dirty="0"/>
-              <a:t>],</a:t>
-            </a:r>
-          </a:p>
-          <a:p>
-            <a:r>
-              <a:rPr lang="en-US" sz="2000" dirty="0"/>
-              <a:t>      </a:t>
-            </a:r>
-            <a:r>
-              <a:rPr lang="en-US" sz="2000" dirty="0" err="1"/>
+              <a:rPr lang="en-US" dirty="0"/>
+              <a:t>], </a:t>
+            </a:r>
+            <a:r>
+              <a:rPr lang="en-US" dirty="0" err="1"/>
               <a:t>providerName</a:t>
             </a:r>
             <a:r>
-              <a:rPr lang="en-US" sz="2000" dirty="0"/>
-              <a:t>: String,</a:t>
-            </a:r>
-          </a:p>
-          <a:p>
-            <a:r>
-              <a:rPr lang="en-US" sz="2000" dirty="0"/>
-              <a:t>      parameters: Map[String, String]): </a:t>
-            </a:r>
-            <a:r>
-              <a:rPr lang="en-US" sz="2000" b="1" dirty="0"/>
+              <a:rPr lang="en-US" dirty="0"/>
+              <a:t>: String, parameters: Map[String, String]): </a:t>
+            </a:r>
+            <a:r>
+              <a:rPr lang="en-US" b="1" dirty="0"/>
               <a:t>Source</a:t>
             </a:r>
-          </a:p>
-          <a:p>
-            <a:r>
-              <a:rPr lang="en-US" sz="2000" dirty="0"/>
+            <a:r>
+              <a:rPr lang="en-US" dirty="0"/>
+              <a:t> = {</a:t>
+            </a:r>
+          </a:p>
+          <a:p>
+            <a:r>
+              <a:rPr lang="en-US" dirty="0"/>
+              <a:t>    new </a:t>
+            </a:r>
+            <a:r>
+              <a:rPr lang="en-US" dirty="0" err="1"/>
+              <a:t>RandomInt</a:t>
+            </a:r>
+            <a:r>
+              <a:rPr lang="en-US" dirty="0"/>
+              <a:t>(</a:t>
+            </a:r>
+            <a:r>
+              <a:rPr lang="en-US" dirty="0" err="1"/>
+              <a:t>sqlContext</a:t>
+            </a:r>
+            <a:r>
+              <a:rPr lang="en-US" dirty="0"/>
+              <a:t>)</a:t>
+            </a:r>
+          </a:p>
+          <a:p>
+            <a:r>
+              <a:rPr lang="en-US" dirty="0"/>
+              <a:t>  }</a:t>
+            </a:r>
+          </a:p>
+          <a:p>
+            <a:endParaRPr lang="en-US" dirty="0"/>
+          </a:p>
+          <a:p>
+            <a:r>
+              <a:rPr lang="en-US" dirty="0"/>
+              <a:t>  override </a:t>
+            </a:r>
+            <a:r>
+              <a:rPr lang="en-US" dirty="0" err="1"/>
+              <a:t>def</a:t>
+            </a:r>
+            <a:r>
+              <a:rPr lang="en-US" dirty="0"/>
+              <a:t> </a:t>
+            </a:r>
+            <a:r>
+              <a:rPr lang="en-US" b="1" dirty="0" err="1"/>
+              <a:t>shortName</a:t>
+            </a:r>
+            <a:r>
+              <a:rPr lang="en-US" dirty="0"/>
+              <a:t>(): String = "Random </a:t>
+            </a:r>
+            <a:r>
+              <a:rPr lang="en-US" dirty="0" err="1"/>
+              <a:t>Int</a:t>
+            </a:r>
+            <a:r>
+              <a:rPr lang="en-US" dirty="0"/>
+              <a:t>"</a:t>
+            </a:r>
+          </a:p>
+          <a:p>
+            <a:r>
+              <a:rPr lang="en-US" dirty="0"/>
               <a:t>}</a:t>
             </a:r>
-            <a:endParaRPr lang="ru-RU" sz="2000" dirty="0"/>
+            <a:endParaRPr lang="ru-RU" dirty="0"/>
           </a:p>
         </p:txBody>
       </p:sp>
     </p:spTree>
     <p:extLst>
       <p:ext uri="{BB962C8B-B14F-4D97-AF65-F5344CB8AC3E}">
-        <p14:creationId xmlns:p14="http://schemas.microsoft.com/office/powerpoint/2010/main" val="2338051069"/>
+        <p14:creationId xmlns:p14="http://schemas.microsoft.com/office/powerpoint/2010/main" val="1517519040"/>
       </p:ext>
     </p:extLst>
   </p:cSld>
@@ -5075,8 +5836,8 @@
         </p:nvSpPr>
         <p:spPr>
           <a:xfrm>
-            <a:off x="0" y="0"/>
-            <a:ext cx="12192000" cy="1325563"/>
+            <a:off x="838200" y="0"/>
+            <a:ext cx="10515600" cy="1325563"/>
           </a:xfrm>
         </p:spPr>
         <p:txBody>
@@ -5085,8 +5846,8 @@
           <a:p>
             <a:pPr algn="ctr"/>
             <a:r>
-              <a:rPr lang="en-US" dirty="0" err="1" smtClean="0"/>
-              <a:t>DataSourceRegister</a:t>
+              <a:rPr lang="en-US" dirty="0" err="1"/>
+              <a:t>StreamSourceProvider</a:t>
             </a:r>
             <a:endParaRPr lang="ru-RU" dirty="0"/>
           </a:p>
@@ -5094,14 +5855,51 @@
       </p:sp>
       <p:sp>
         <p:nvSpPr>
-          <p:cNvPr id="5" name="Прямоугольник 4"/>
+          <p:cNvPr id="3" name="Объект 2"/>
+          <p:cNvSpPr>
+            <a:spLocks noGrp="1"/>
+          </p:cNvSpPr>
+          <p:nvPr>
+            <p:ph idx="1"/>
+          </p:nvPr>
+        </p:nvSpPr>
+        <p:spPr>
+          <a:xfrm>
+            <a:off x="838200" y="1152385"/>
+            <a:ext cx="10515600" cy="796995"/>
+          </a:xfrm>
+        </p:spPr>
+        <p:txBody>
+          <a:bodyPr>
+            <a:normAutofit lnSpcReduction="10000"/>
+          </a:bodyPr>
+          <a:lstStyle/>
+          <a:p>
+            <a:pPr marL="0" indent="0">
+              <a:buNone/>
+            </a:pPr>
+            <a:r>
+              <a:rPr lang="en-US" dirty="0" smtClean="0"/>
+              <a:t>	Implemented </a:t>
+            </a:r>
+            <a:r>
+              <a:rPr lang="en-US" dirty="0"/>
+              <a:t>by objects that can produce a streaming `Source` for a specific format or system</a:t>
+            </a:r>
+            <a:endParaRPr lang="ru-RU" dirty="0"/>
+          </a:p>
+        </p:txBody>
+      </p:sp>
+      <p:sp>
+        <p:nvSpPr>
+          <p:cNvPr id="7" name="Прямоугольник 6"/>
           <p:cNvSpPr/>
           <p:nvPr/>
         </p:nvSpPr>
         <p:spPr>
           <a:xfrm>
-            <a:off x="207665" y="1103535"/>
-            <a:ext cx="11776669" cy="2246769"/>
+            <a:off x="938683" y="2028439"/>
+            <a:ext cx="10058400" cy="4708981"/>
           </a:xfrm>
           <a:prstGeom prst="rect">
             <a:avLst/>
@@ -5115,185 +5913,214 @@
           <a:p>
             <a:r>
               <a:rPr lang="en-US" sz="2000" dirty="0"/>
-              <a:t>/**</a:t>
-            </a:r>
-          </a:p>
-          <a:p>
+              <a:t>trait </a:t>
+            </a:r>
+            <a:r>
+              <a:rPr lang="en-US" sz="2000" dirty="0" err="1"/>
+              <a:t>StreamSourceProvider</a:t>
+            </a:r>
             <a:r>
               <a:rPr lang="en-US" sz="2000" dirty="0"/>
-              <a:t> * Data sources should implement this trait so that they can register an alias to their data source.</a:t>
-            </a:r>
-          </a:p>
-          <a:p>
+              <a:t> {</a:t>
+            </a:r>
+          </a:p>
+          <a:p>
+            <a:endParaRPr lang="en-US" sz="2000" dirty="0" smtClean="0"/>
+          </a:p>
+          <a:p>
+            <a:r>
+              <a:rPr lang="en-US" sz="2000" dirty="0" err="1" smtClean="0"/>
+              <a:t>def</a:t>
+            </a:r>
+            <a:r>
+              <a:rPr lang="en-US" sz="2000" dirty="0" smtClean="0"/>
+              <a:t> </a:t>
+            </a:r>
+            <a:r>
+              <a:rPr lang="en-US" sz="2000" b="1" dirty="0" err="1"/>
+              <a:t>sourceSchema</a:t>
+            </a:r>
             <a:r>
               <a:rPr lang="en-US" sz="2000" dirty="0"/>
-              <a:t> * This allows users to give the data source alias as the format type over the fully qualified</a:t>
+              <a:t>(</a:t>
             </a:r>
           </a:p>
           <a:p>
             <a:r>
               <a:rPr lang="en-US" sz="2000" dirty="0"/>
-              <a:t> * class name.</a:t>
-            </a:r>
-          </a:p>
-          <a:p>
+              <a:t>      </a:t>
+            </a:r>
+            <a:r>
+              <a:rPr lang="en-US" sz="2000" dirty="0" err="1"/>
+              <a:t>sqlContext</a:t>
+            </a:r>
             <a:r>
               <a:rPr lang="en-US" sz="2000" dirty="0"/>
-              <a:t> *</a:t>
-            </a:r>
-          </a:p>
-          <a:p>
+              <a:t>: </a:t>
+            </a:r>
+            <a:r>
+              <a:rPr lang="en-US" sz="2000" dirty="0" err="1"/>
+              <a:t>SQLContext</a:t>
+            </a:r>
             <a:r>
               <a:rPr lang="en-US" sz="2000" dirty="0"/>
-              <a:t> * A new instance of this class will be instantiated each time a DDL call is made.</a:t>
+              <a:t>,</a:t>
             </a:r>
           </a:p>
           <a:p>
             <a:r>
               <a:rPr lang="en-US" sz="2000" dirty="0"/>
-              <a:t> */</a:t>
+              <a:t>      schema: Option[</a:t>
+            </a:r>
+            <a:r>
+              <a:rPr lang="en-US" sz="2000" dirty="0" err="1"/>
+              <a:t>StructType</a:t>
+            </a:r>
+            <a:r>
+              <a:rPr lang="en-US" sz="2000" dirty="0"/>
+              <a:t>],</a:t>
+            </a:r>
+          </a:p>
+          <a:p>
+            <a:r>
+              <a:rPr lang="en-US" sz="2000" dirty="0"/>
+              <a:t>      </a:t>
+            </a:r>
+            <a:r>
+              <a:rPr lang="en-US" sz="2000" dirty="0" err="1"/>
+              <a:t>providerName</a:t>
+            </a:r>
+            <a:r>
+              <a:rPr lang="en-US" sz="2000" dirty="0"/>
+              <a:t>: String,</a:t>
+            </a:r>
+          </a:p>
+          <a:p>
+            <a:r>
+              <a:rPr lang="en-US" sz="2000" dirty="0"/>
+              <a:t>      parameters: Map[String, String]): </a:t>
+            </a:r>
+            <a:r>
+              <a:rPr lang="en-US" sz="2000" b="1" dirty="0"/>
+              <a:t>(String, </a:t>
+            </a:r>
+            <a:r>
+              <a:rPr lang="en-US" sz="2000" b="1" dirty="0" err="1"/>
+              <a:t>StructType</a:t>
+            </a:r>
+            <a:r>
+              <a:rPr lang="en-US" sz="2000" b="1" dirty="0"/>
+              <a:t>)</a:t>
+            </a:r>
+          </a:p>
+          <a:p>
+            <a:endParaRPr lang="en-US" sz="2000" dirty="0" smtClean="0"/>
+          </a:p>
+          <a:p>
+            <a:r>
+              <a:rPr lang="en-US" sz="2000" dirty="0" err="1" smtClean="0"/>
+              <a:t>def</a:t>
+            </a:r>
+            <a:r>
+              <a:rPr lang="en-US" sz="2000" dirty="0" smtClean="0"/>
+              <a:t> </a:t>
+            </a:r>
+            <a:r>
+              <a:rPr lang="en-US" sz="2000" b="1" dirty="0" err="1"/>
+              <a:t>createSource</a:t>
+            </a:r>
+            <a:r>
+              <a:rPr lang="en-US" sz="2000" dirty="0"/>
+              <a:t>(</a:t>
+            </a:r>
+          </a:p>
+          <a:p>
+            <a:r>
+              <a:rPr lang="en-US" sz="2000" dirty="0"/>
+              <a:t>      </a:t>
+            </a:r>
+            <a:r>
+              <a:rPr lang="en-US" sz="2000" dirty="0" err="1"/>
+              <a:t>sqlContext</a:t>
+            </a:r>
+            <a:r>
+              <a:rPr lang="en-US" sz="2000" dirty="0"/>
+              <a:t>: </a:t>
+            </a:r>
+            <a:r>
+              <a:rPr lang="en-US" sz="2000" dirty="0" err="1"/>
+              <a:t>SQLContext</a:t>
+            </a:r>
+            <a:r>
+              <a:rPr lang="en-US" sz="2000" dirty="0"/>
+              <a:t>,</a:t>
+            </a:r>
+          </a:p>
+          <a:p>
+            <a:r>
+              <a:rPr lang="en-US" sz="2000" dirty="0"/>
+              <a:t>      </a:t>
+            </a:r>
+            <a:r>
+              <a:rPr lang="en-US" sz="2000" dirty="0" err="1"/>
+              <a:t>metadataPath</a:t>
+            </a:r>
+            <a:r>
+              <a:rPr lang="en-US" sz="2000" dirty="0"/>
+              <a:t>: String,</a:t>
+            </a:r>
+          </a:p>
+          <a:p>
+            <a:r>
+              <a:rPr lang="en-US" sz="2000" dirty="0"/>
+              <a:t>      schema: Option[</a:t>
+            </a:r>
+            <a:r>
+              <a:rPr lang="en-US" sz="2000" dirty="0" err="1"/>
+              <a:t>StructType</a:t>
+            </a:r>
+            <a:r>
+              <a:rPr lang="en-US" sz="2000" dirty="0"/>
+              <a:t>],</a:t>
+            </a:r>
+          </a:p>
+          <a:p>
+            <a:r>
+              <a:rPr lang="en-US" sz="2000" dirty="0"/>
+              <a:t>      </a:t>
+            </a:r>
+            <a:r>
+              <a:rPr lang="en-US" sz="2000" dirty="0" err="1"/>
+              <a:t>providerName</a:t>
+            </a:r>
+            <a:r>
+              <a:rPr lang="en-US" sz="2000" dirty="0"/>
+              <a:t>: String,</a:t>
+            </a:r>
+          </a:p>
+          <a:p>
+            <a:r>
+              <a:rPr lang="en-US" sz="2000" dirty="0"/>
+              <a:t>      parameters: Map[String, String]): </a:t>
+            </a:r>
+            <a:r>
+              <a:rPr lang="en-US" sz="2000" b="1" dirty="0"/>
+              <a:t>Source</a:t>
+            </a:r>
+          </a:p>
+          <a:p>
+            <a:r>
+              <a:rPr lang="en-US" sz="2000" dirty="0"/>
+              <a:t>}</a:t>
             </a:r>
             <a:endParaRPr lang="ru-RU" sz="2000" dirty="0"/>
-          </a:p>
-        </p:txBody>
-      </p:sp>
-      <p:sp>
-        <p:nvSpPr>
-          <p:cNvPr id="6" name="Прямоугольник 5"/>
-          <p:cNvSpPr/>
-          <p:nvPr/>
-        </p:nvSpPr>
-        <p:spPr>
-          <a:xfrm>
-            <a:off x="207666" y="3477963"/>
-            <a:ext cx="11984334" cy="3139321"/>
-          </a:xfrm>
-          <a:prstGeom prst="rect">
-            <a:avLst/>
-          </a:prstGeom>
-        </p:spPr>
-        <p:txBody>
-          <a:bodyPr wrap="square">
-            <a:spAutoFit/>
-          </a:bodyPr>
-          <a:lstStyle/>
-          <a:p>
-            <a:r>
-              <a:rPr lang="en-US" dirty="0"/>
-              <a:t>trait </a:t>
-            </a:r>
-            <a:r>
-              <a:rPr lang="en-US" b="1" dirty="0" err="1"/>
-              <a:t>DataSourceRegister</a:t>
-            </a:r>
-            <a:r>
-              <a:rPr lang="en-US" dirty="0"/>
-              <a:t> {</a:t>
-            </a:r>
-          </a:p>
-          <a:p>
-            <a:r>
-              <a:rPr lang="en-US" dirty="0" smtClean="0"/>
-              <a:t>  </a:t>
-            </a:r>
-            <a:r>
-              <a:rPr lang="en-US" dirty="0"/>
-              <a:t>/**</a:t>
-            </a:r>
-          </a:p>
-          <a:p>
-            <a:r>
-              <a:rPr lang="en-US" dirty="0"/>
-              <a:t>   * The string that represents the format that this data source provider uses. This is</a:t>
-            </a:r>
-          </a:p>
-          <a:p>
-            <a:r>
-              <a:rPr lang="en-US" dirty="0"/>
-              <a:t>   * overridden by children to provide a nice alias for the data source. For example:</a:t>
-            </a:r>
-          </a:p>
-          <a:p>
-            <a:r>
-              <a:rPr lang="en-US" dirty="0"/>
-              <a:t>   *</a:t>
-            </a:r>
-          </a:p>
-          <a:p>
-            <a:r>
-              <a:rPr lang="en-US" dirty="0"/>
-              <a:t>   * {{{</a:t>
-            </a:r>
-          </a:p>
-          <a:p>
-            <a:r>
-              <a:rPr lang="en-US" dirty="0"/>
-              <a:t>   *   override </a:t>
-            </a:r>
-            <a:r>
-              <a:rPr lang="en-US" dirty="0" err="1"/>
-              <a:t>def</a:t>
-            </a:r>
-            <a:r>
-              <a:rPr lang="en-US" dirty="0"/>
-              <a:t> </a:t>
-            </a:r>
-            <a:r>
-              <a:rPr lang="en-US" dirty="0" err="1"/>
-              <a:t>shortName</a:t>
-            </a:r>
-            <a:r>
-              <a:rPr lang="en-US" dirty="0"/>
-              <a:t>(): String = "parquet"</a:t>
-            </a:r>
-          </a:p>
-          <a:p>
-            <a:r>
-              <a:rPr lang="en-US" dirty="0"/>
-              <a:t>   * }}}</a:t>
-            </a:r>
-          </a:p>
-          <a:p>
-            <a:r>
-              <a:rPr lang="en-US" dirty="0" smtClean="0"/>
-              <a:t>*/</a:t>
-            </a:r>
-            <a:endParaRPr lang="en-US" dirty="0"/>
-          </a:p>
-          <a:p>
-            <a:r>
-              <a:rPr lang="en-US" dirty="0"/>
-              <a:t>  </a:t>
-            </a:r>
-            <a:r>
-              <a:rPr lang="en-US" b="1" dirty="0" err="1"/>
-              <a:t>def</a:t>
-            </a:r>
-            <a:r>
-              <a:rPr lang="en-US" b="1" dirty="0"/>
-              <a:t> </a:t>
-            </a:r>
-            <a:r>
-              <a:rPr lang="en-US" b="1" dirty="0" err="1"/>
-              <a:t>shortName</a:t>
-            </a:r>
-            <a:r>
-              <a:rPr lang="en-US" b="1" dirty="0"/>
-              <a:t>(): String</a:t>
-            </a:r>
-          </a:p>
-          <a:p>
-            <a:r>
-              <a:rPr lang="en-US" dirty="0"/>
-              <a:t>}</a:t>
-            </a:r>
           </a:p>
         </p:txBody>
       </p:sp>
     </p:spTree>
     <p:extLst>
       <p:ext uri="{BB962C8B-B14F-4D97-AF65-F5344CB8AC3E}">
-        <p14:creationId xmlns:p14="http://schemas.microsoft.com/office/powerpoint/2010/main" val="401288326"/>
+        <p14:creationId xmlns:p14="http://schemas.microsoft.com/office/powerpoint/2010/main" val="2338051069"/>
       </p:ext>
     </p:extLst>
   </p:cSld>
@@ -5340,7 +6167,7 @@
         <p:spPr>
           <a:xfrm>
             <a:off x="0" y="0"/>
-            <a:ext cx="12191999" cy="1325563"/>
+            <a:ext cx="12192000" cy="1325563"/>
           </a:xfrm>
         </p:spPr>
         <p:txBody>
@@ -5349,8 +6176,8 @@
           <a:p>
             <a:pPr algn="ctr"/>
             <a:r>
-              <a:rPr lang="en-US" dirty="0" err="1"/>
-              <a:t>CustomSource</a:t>
+              <a:rPr lang="en-US" dirty="0" err="1" smtClean="0"/>
+              <a:t>DataSourceRegister</a:t>
             </a:r>
             <a:endParaRPr lang="ru-RU" dirty="0"/>
           </a:p>
@@ -5358,14 +6185,14 @@
       </p:sp>
       <p:sp>
         <p:nvSpPr>
-          <p:cNvPr id="4" name="Прямоугольник 3"/>
+          <p:cNvPr id="5" name="Прямоугольник 4"/>
           <p:cNvSpPr/>
           <p:nvPr/>
         </p:nvSpPr>
         <p:spPr>
           <a:xfrm>
-            <a:off x="486508" y="1151101"/>
-            <a:ext cx="10515600" cy="5632311"/>
+            <a:off x="207665" y="1103535"/>
+            <a:ext cx="11776669" cy="2246769"/>
           </a:xfrm>
           <a:prstGeom prst="rect">
             <a:avLst/>
@@ -5378,278 +6205,186 @@
           <a:lstStyle/>
           <a:p>
             <a:r>
-              <a:rPr lang="en-US" sz="2400" dirty="0"/>
-              <a:t>class </a:t>
-            </a:r>
-            <a:r>
-              <a:rPr lang="en-US" sz="2400" b="1" dirty="0" err="1"/>
-              <a:t>CustomSource</a:t>
-            </a:r>
-            <a:r>
-              <a:rPr lang="en-US" sz="2400" dirty="0"/>
-              <a:t>  extends </a:t>
-            </a:r>
-            <a:r>
-              <a:rPr lang="en-US" sz="2400" b="1" dirty="0" err="1"/>
-              <a:t>StreamSourceProvider</a:t>
-            </a:r>
-            <a:r>
-              <a:rPr lang="en-US" sz="2400" b="1" dirty="0"/>
-              <a:t> with </a:t>
-            </a:r>
-            <a:r>
-              <a:rPr lang="en-US" sz="2400" b="1" dirty="0" err="1"/>
+              <a:rPr lang="en-US" sz="2000" dirty="0"/>
+              <a:t>/**</a:t>
+            </a:r>
+          </a:p>
+          <a:p>
+            <a:r>
+              <a:rPr lang="en-US" sz="2000" dirty="0"/>
+              <a:t> * Data sources should implement this trait so that they can register an alias to their data source.</a:t>
+            </a:r>
+          </a:p>
+          <a:p>
+            <a:r>
+              <a:rPr lang="en-US" sz="2000" dirty="0"/>
+              <a:t> * This allows users to give the data source alias as the format type over the fully qualified</a:t>
+            </a:r>
+          </a:p>
+          <a:p>
+            <a:r>
+              <a:rPr lang="en-US" sz="2000" dirty="0"/>
+              <a:t> * class name.</a:t>
+            </a:r>
+          </a:p>
+          <a:p>
+            <a:r>
+              <a:rPr lang="en-US" sz="2000" dirty="0"/>
+              <a:t> *</a:t>
+            </a:r>
+          </a:p>
+          <a:p>
+            <a:r>
+              <a:rPr lang="en-US" sz="2000" dirty="0"/>
+              <a:t> * A new instance of this class will be instantiated each time a DDL call is made.</a:t>
+            </a:r>
+          </a:p>
+          <a:p>
+            <a:r>
+              <a:rPr lang="en-US" sz="2000" dirty="0"/>
+              <a:t> */</a:t>
+            </a:r>
+            <a:endParaRPr lang="ru-RU" sz="2000" dirty="0"/>
+          </a:p>
+        </p:txBody>
+      </p:sp>
+      <p:sp>
+        <p:nvSpPr>
+          <p:cNvPr id="6" name="Прямоугольник 5"/>
+          <p:cNvSpPr/>
+          <p:nvPr/>
+        </p:nvSpPr>
+        <p:spPr>
+          <a:xfrm>
+            <a:off x="207666" y="3477963"/>
+            <a:ext cx="11984334" cy="3139321"/>
+          </a:xfrm>
+          <a:prstGeom prst="rect">
+            <a:avLst/>
+          </a:prstGeom>
+        </p:spPr>
+        <p:txBody>
+          <a:bodyPr wrap="square">
+            <a:spAutoFit/>
+          </a:bodyPr>
+          <a:lstStyle/>
+          <a:p>
+            <a:r>
+              <a:rPr lang="en-US" dirty="0"/>
+              <a:t>trait </a:t>
+            </a:r>
+            <a:r>
+              <a:rPr lang="en-US" b="1" dirty="0" err="1"/>
               <a:t>DataSourceRegister</a:t>
             </a:r>
             <a:r>
-              <a:rPr lang="en-US" sz="2400" dirty="0"/>
-              <a:t>  {</a:t>
-            </a:r>
-          </a:p>
-          <a:p>
-            <a:endParaRPr lang="en-US" sz="2400" dirty="0"/>
-          </a:p>
-          <a:p>
-            <a:r>
-              <a:rPr lang="en-US" sz="2400" dirty="0"/>
-              <a:t>  override </a:t>
-            </a:r>
-            <a:r>
-              <a:rPr lang="en-US" sz="2400" dirty="0" err="1"/>
+              <a:rPr lang="en-US" dirty="0"/>
+              <a:t> {</a:t>
+            </a:r>
+          </a:p>
+          <a:p>
+            <a:r>
+              <a:rPr lang="en-US" dirty="0" smtClean="0"/>
+              <a:t>  </a:t>
+            </a:r>
+            <a:r>
+              <a:rPr lang="en-US" dirty="0"/>
+              <a:t>/**</a:t>
+            </a:r>
+          </a:p>
+          <a:p>
+            <a:r>
+              <a:rPr lang="en-US" dirty="0"/>
+              <a:t>   * The string that represents the format that this data source provider uses. This is</a:t>
+            </a:r>
+          </a:p>
+          <a:p>
+            <a:r>
+              <a:rPr lang="en-US" dirty="0"/>
+              <a:t>   * overridden by children to provide a nice alias for the data source. For example:</a:t>
+            </a:r>
+          </a:p>
+          <a:p>
+            <a:r>
+              <a:rPr lang="en-US" dirty="0"/>
+              <a:t>   *</a:t>
+            </a:r>
+          </a:p>
+          <a:p>
+            <a:r>
+              <a:rPr lang="en-US" dirty="0"/>
+              <a:t>   * {{{</a:t>
+            </a:r>
+          </a:p>
+          <a:p>
+            <a:r>
+              <a:rPr lang="en-US" dirty="0"/>
+              <a:t>   *   override </a:t>
+            </a:r>
+            <a:r>
+              <a:rPr lang="en-US" dirty="0" err="1"/>
               <a:t>def</a:t>
             </a:r>
             <a:r>
-              <a:rPr lang="en-US" sz="2400" dirty="0"/>
+              <a:rPr lang="en-US" dirty="0"/>
               <a:t> </a:t>
             </a:r>
             <a:r>
-              <a:rPr lang="en-US" sz="2400" b="1" dirty="0" err="1"/>
-              <a:t>sourceSchema</a:t>
-            </a:r>
-            <a:r>
-              <a:rPr lang="en-US" sz="2400" dirty="0"/>
-              <a:t>(</a:t>
-            </a:r>
-            <a:r>
-              <a:rPr lang="en-US" sz="2400" dirty="0" err="1"/>
-              <a:t>sqlContext</a:t>
-            </a:r>
-            <a:r>
-              <a:rPr lang="en-US" sz="2400" dirty="0"/>
-              <a:t>: </a:t>
-            </a:r>
-            <a:r>
-              <a:rPr lang="en-US" sz="2400" dirty="0" err="1"/>
-              <a:t>SQLContext</a:t>
-            </a:r>
-            <a:r>
-              <a:rPr lang="en-US" sz="2400" dirty="0"/>
-              <a:t>, schema: Option[</a:t>
-            </a:r>
-            <a:r>
-              <a:rPr lang="en-US" sz="2400" dirty="0" err="1"/>
-              <a:t>StructType</a:t>
-            </a:r>
-            <a:r>
-              <a:rPr lang="en-US" sz="2400" dirty="0"/>
-              <a:t>], </a:t>
-            </a:r>
-            <a:r>
-              <a:rPr lang="en-US" sz="2400" dirty="0" err="1"/>
-              <a:t>providerName</a:t>
-            </a:r>
-            <a:r>
-              <a:rPr lang="en-US" sz="2400" dirty="0"/>
-              <a:t>: String, parameters: Map[String, String]): (String, </a:t>
-            </a:r>
-            <a:r>
-              <a:rPr lang="en-US" sz="2400" dirty="0" err="1"/>
-              <a:t>StructType</a:t>
-            </a:r>
-            <a:r>
-              <a:rPr lang="en-US" sz="2400" dirty="0"/>
-              <a:t>) = {</a:t>
-            </a:r>
-          </a:p>
-          <a:p>
-            <a:r>
-              <a:rPr lang="en-US" sz="2400" dirty="0"/>
-              <a:t>    (</a:t>
-            </a:r>
-            <a:r>
-              <a:rPr lang="en-US" sz="2400" dirty="0" err="1"/>
+              <a:rPr lang="en-US" dirty="0" err="1"/>
               <a:t>shortName</a:t>
             </a:r>
             <a:r>
-              <a:rPr lang="en-US" sz="2400" dirty="0"/>
-              <a:t>(), </a:t>
-            </a:r>
-            <a:r>
-              <a:rPr lang="en-US" sz="2400" dirty="0" err="1"/>
-              <a:t>RandomInt.schema</a:t>
-            </a:r>
-            <a:r>
-              <a:rPr lang="en-US" sz="2400" dirty="0"/>
-              <a:t>)</a:t>
-            </a:r>
-          </a:p>
-          <a:p>
-            <a:r>
-              <a:rPr lang="en-US" sz="2400" dirty="0"/>
-              <a:t>  }</a:t>
-            </a:r>
-          </a:p>
-          <a:p>
-            <a:endParaRPr lang="en-US" sz="2400" dirty="0"/>
-          </a:p>
-          <a:p>
-            <a:r>
-              <a:rPr lang="en-US" sz="2400" dirty="0"/>
-              <a:t>  override </a:t>
-            </a:r>
-            <a:r>
-              <a:rPr lang="en-US" sz="2400" dirty="0" err="1"/>
+              <a:rPr lang="en-US" dirty="0"/>
+              <a:t>(): String = "parquet"</a:t>
+            </a:r>
+          </a:p>
+          <a:p>
+            <a:r>
+              <a:rPr lang="en-US" dirty="0"/>
+              <a:t>   * }}}</a:t>
+            </a:r>
+          </a:p>
+          <a:p>
+            <a:r>
+              <a:rPr lang="en-US" dirty="0" smtClean="0"/>
+              <a:t>*/</a:t>
+            </a:r>
+            <a:endParaRPr lang="en-US" dirty="0"/>
+          </a:p>
+          <a:p>
+            <a:r>
+              <a:rPr lang="en-US" dirty="0"/>
+              <a:t>  </a:t>
+            </a:r>
+            <a:r>
+              <a:rPr lang="en-US" b="1" dirty="0" err="1"/>
               <a:t>def</a:t>
             </a:r>
             <a:r>
-              <a:rPr lang="en-US" sz="2400" dirty="0"/>
+              <a:rPr lang="en-US" b="1" dirty="0"/>
               <a:t> </a:t>
             </a:r>
             <a:r>
-              <a:rPr lang="en-US" sz="2400" dirty="0" err="1"/>
-              <a:t>c</a:t>
-            </a:r>
-            <a:r>
-              <a:rPr lang="en-US" sz="2400" b="1" dirty="0" err="1"/>
-              <a:t>reateSource</a:t>
-            </a:r>
-            <a:r>
-              <a:rPr lang="en-US" sz="2400" dirty="0"/>
-              <a:t>(</a:t>
-            </a:r>
-            <a:r>
-              <a:rPr lang="en-US" sz="2400" dirty="0" err="1"/>
-              <a:t>sqlContext</a:t>
-            </a:r>
-            <a:r>
-              <a:rPr lang="en-US" sz="2400" dirty="0"/>
-              <a:t>: </a:t>
-            </a:r>
-            <a:r>
-              <a:rPr lang="en-US" sz="2400" dirty="0" err="1"/>
-              <a:t>SQLContext</a:t>
-            </a:r>
-            <a:r>
-              <a:rPr lang="en-US" sz="2400" dirty="0"/>
-              <a:t>, </a:t>
-            </a:r>
-            <a:r>
-              <a:rPr lang="en-US" sz="2400" dirty="0" err="1"/>
-              <a:t>metadataPath</a:t>
-            </a:r>
-            <a:r>
-              <a:rPr lang="en-US" sz="2400" dirty="0"/>
-              <a:t>: String, schema: Option[</a:t>
-            </a:r>
-            <a:r>
-              <a:rPr lang="en-US" sz="2400" dirty="0" err="1"/>
-              <a:t>StructType</a:t>
-            </a:r>
-            <a:r>
-              <a:rPr lang="en-US" sz="2400" dirty="0"/>
-              <a:t>], </a:t>
-            </a:r>
-            <a:r>
-              <a:rPr lang="en-US" sz="2400" dirty="0" err="1"/>
-              <a:t>providerName</a:t>
-            </a:r>
-            <a:r>
-              <a:rPr lang="en-US" sz="2400" dirty="0"/>
-              <a:t>: String, parameters: Map[String, String]): </a:t>
-            </a:r>
-            <a:r>
-              <a:rPr lang="en-US" sz="2400" b="1" dirty="0"/>
-              <a:t>Source</a:t>
-            </a:r>
-            <a:r>
-              <a:rPr lang="en-US" sz="2400" dirty="0"/>
-              <a:t> = {</a:t>
-            </a:r>
-          </a:p>
-          <a:p>
-            <a:r>
-              <a:rPr lang="en-US" sz="2400" b="1" dirty="0"/>
-              <a:t>    new </a:t>
-            </a:r>
-            <a:r>
-              <a:rPr lang="en-US" sz="2400" b="1" dirty="0" err="1"/>
-              <a:t>RandomInt</a:t>
-            </a:r>
-            <a:r>
-              <a:rPr lang="en-US" sz="2400" b="1" dirty="0"/>
-              <a:t>(</a:t>
-            </a:r>
-            <a:r>
-              <a:rPr lang="en-US" sz="2400" b="1" dirty="0" err="1"/>
-              <a:t>sqlContext</a:t>
-            </a:r>
-            <a:r>
-              <a:rPr lang="en-US" sz="2400" b="1" dirty="0"/>
-              <a:t>)</a:t>
-            </a:r>
-          </a:p>
-          <a:p>
-            <a:r>
-              <a:rPr lang="en-US" sz="2400" dirty="0"/>
-              <a:t>  }</a:t>
-            </a:r>
-          </a:p>
-          <a:p>
-            <a:endParaRPr lang="en-US" sz="2400" dirty="0"/>
-          </a:p>
-          <a:p>
-            <a:r>
-              <a:rPr lang="en-US" sz="2400" dirty="0"/>
-              <a:t>  override </a:t>
-            </a:r>
-            <a:r>
-              <a:rPr lang="en-US" sz="2400" dirty="0" err="1"/>
-              <a:t>def</a:t>
-            </a:r>
-            <a:r>
-              <a:rPr lang="en-US" sz="2400" dirty="0"/>
-              <a:t> </a:t>
-            </a:r>
-            <a:r>
-              <a:rPr lang="en-US" sz="2400" dirty="0" err="1"/>
+              <a:rPr lang="en-US" b="1" dirty="0" err="1"/>
               <a:t>shortName</a:t>
             </a:r>
             <a:r>
-              <a:rPr lang="en-US" sz="2400" dirty="0"/>
-              <a:t>(): String = "Random </a:t>
-            </a:r>
-            <a:r>
-              <a:rPr lang="en-US" sz="2400" dirty="0" err="1"/>
-              <a:t>Int</a:t>
-            </a:r>
-            <a:r>
-              <a:rPr lang="en-US" sz="2400" dirty="0"/>
-              <a:t>"</a:t>
-            </a:r>
-          </a:p>
-          <a:p>
-            <a:r>
-              <a:rPr lang="en-US" sz="2400" dirty="0"/>
+              <a:rPr lang="en-US" b="1" dirty="0"/>
+              <a:t>(): String</a:t>
+            </a:r>
+          </a:p>
+          <a:p>
+            <a:r>
+              <a:rPr lang="en-US" dirty="0"/>
               <a:t>}</a:t>
             </a:r>
-            <a:endParaRPr lang="ru-RU" sz="2400" dirty="0"/>
           </a:p>
         </p:txBody>
       </p:sp>
     </p:spTree>
     <p:extLst>
       <p:ext uri="{BB962C8B-B14F-4D97-AF65-F5344CB8AC3E}">
-        <p14:creationId xmlns:p14="http://schemas.microsoft.com/office/powerpoint/2010/main" val="2200473924"/>
+        <p14:creationId xmlns:p14="http://schemas.microsoft.com/office/powerpoint/2010/main" val="401288326"/>
       </p:ext>
     </p:extLst>
   </p:cSld>
@@ -5693,30 +6428,35 @@
             <p:ph type="title"/>
           </p:nvPr>
         </p:nvSpPr>
-        <p:spPr/>
+        <p:spPr>
+          <a:xfrm>
+            <a:off x="0" y="0"/>
+            <a:ext cx="12191999" cy="1325563"/>
+          </a:xfrm>
+        </p:spPr>
         <p:txBody>
           <a:bodyPr/>
           <a:lstStyle/>
           <a:p>
             <a:pPr algn="ctr"/>
             <a:r>
-              <a:rPr lang="en-US" b="1" dirty="0" smtClean="0"/>
-              <a:t>Source</a:t>
-            </a:r>
-            <a:endParaRPr lang="ru-RU" b="1" dirty="0"/>
-          </a:p>
-        </p:txBody>
-      </p:sp>
-      <p:sp>
-        <p:nvSpPr>
-          <p:cNvPr id="5" name="Прямоугольник 4"/>
+              <a:rPr lang="en-US" dirty="0" err="1"/>
+              <a:t>CustomSource</a:t>
+            </a:r>
+            <a:endParaRPr lang="ru-RU" dirty="0"/>
+          </a:p>
+        </p:txBody>
+      </p:sp>
+      <p:sp>
+        <p:nvSpPr>
+          <p:cNvPr id="4" name="Прямоугольник 3"/>
           <p:cNvSpPr/>
           <p:nvPr/>
         </p:nvSpPr>
         <p:spPr>
           <a:xfrm>
-            <a:off x="281354" y="1720840"/>
-            <a:ext cx="11836958" cy="3416320"/>
+            <a:off x="486508" y="1151101"/>
+            <a:ext cx="10515600" cy="5632311"/>
           </a:xfrm>
           <a:prstGeom prst="rect">
             <a:avLst/>
@@ -5730,57 +6470,268 @@
           <a:p>
             <a:r>
               <a:rPr lang="en-US" sz="2400" dirty="0"/>
-              <a:t>/**</a:t>
-            </a:r>
-          </a:p>
-          <a:p>
-            <a:r>
-              <a:rPr lang="en-US" sz="2400" dirty="0"/>
-              <a:t> * A source of continually arriving data for a streaming query. A [[Source]] must have a</a:t>
-            </a:r>
-          </a:p>
-          <a:p>
-            <a:r>
-              <a:rPr lang="en-US" sz="2400" dirty="0"/>
-              <a:t> * monotonically increasing notion of progress that can be represented as an [[Offset]]. Spark</a:t>
-            </a:r>
-          </a:p>
-          <a:p>
-            <a:r>
-              <a:rPr lang="en-US" sz="2400" dirty="0"/>
-              <a:t> * will regularly query each [[Source]] to see if any more data is available.</a:t>
-            </a:r>
-          </a:p>
-          <a:p>
-            <a:r>
-              <a:rPr lang="en-US" sz="2400" dirty="0"/>
-              <a:t> *</a:t>
-            </a:r>
-          </a:p>
-          <a:p>
-            <a:r>
-              <a:rPr lang="en-US" sz="2400" dirty="0"/>
-              <a:t> * Note that, we extends `</a:t>
+              <a:t>class </a:t>
+            </a:r>
+            <a:r>
+              <a:rPr lang="en-US" sz="2400" b="1" dirty="0" err="1"/>
+              <a:t>CustomSource</a:t>
+            </a:r>
+            <a:r>
+              <a:rPr lang="en-US" sz="2400" dirty="0"/>
+              <a:t>  extends </a:t>
+            </a:r>
+            <a:r>
+              <a:rPr lang="en-US" sz="2400" b="1" dirty="0" err="1"/>
+              <a:t>StreamSourceProvider</a:t>
+            </a:r>
+            <a:r>
+              <a:rPr lang="en-US" sz="2400" b="1" dirty="0"/>
+              <a:t> with </a:t>
+            </a:r>
+            <a:r>
+              <a:rPr lang="en-US" sz="2400" b="1" dirty="0" err="1"/>
+              <a:t>DataSourceRegister</a:t>
+            </a:r>
+            <a:r>
+              <a:rPr lang="en-US" sz="2400" dirty="0"/>
+              <a:t>  {</a:t>
+            </a:r>
+          </a:p>
+          <a:p>
+            <a:endParaRPr lang="en-US" sz="2400" dirty="0"/>
+          </a:p>
+          <a:p>
+            <a:r>
+              <a:rPr lang="en-US" sz="2400" dirty="0"/>
+              <a:t>  override </a:t>
             </a:r>
             <a:r>
               <a:rPr lang="en-US" sz="2400" dirty="0" err="1"/>
-              <a:t>SparkDataStream</a:t>
-            </a:r>
-            <a:r>
-              <a:rPr lang="en-US" sz="2400" dirty="0"/>
-              <a:t>` here, to make the v1 streaming source API be compatible</a:t>
-            </a:r>
-          </a:p>
-          <a:p>
-            <a:r>
-              <a:rPr lang="en-US" sz="2400" dirty="0"/>
-              <a:t> * with data source v2.</a:t>
-            </a:r>
-          </a:p>
-          <a:p>
-            <a:r>
-              <a:rPr lang="en-US" sz="2400" dirty="0"/>
-              <a:t> */</a:t>
+              <a:t>def</a:t>
+            </a:r>
+            <a:r>
+              <a:rPr lang="en-US" sz="2400" dirty="0"/>
+              <a:t> </a:t>
+            </a:r>
+            <a:r>
+              <a:rPr lang="en-US" sz="2400" b="1" dirty="0" err="1"/>
+              <a:t>sourceSchema</a:t>
+            </a:r>
+            <a:r>
+              <a:rPr lang="en-US" sz="2400" dirty="0"/>
+              <a:t>(</a:t>
+            </a:r>
+            <a:r>
+              <a:rPr lang="en-US" sz="2400" dirty="0" err="1"/>
+              <a:t>sqlContext</a:t>
+            </a:r>
+            <a:r>
+              <a:rPr lang="en-US" sz="2400" dirty="0"/>
+              <a:t>: </a:t>
+            </a:r>
+            <a:r>
+              <a:rPr lang="en-US" sz="2400" dirty="0" err="1"/>
+              <a:t>SQLContext</a:t>
+            </a:r>
+            <a:r>
+              <a:rPr lang="en-US" sz="2400" dirty="0"/>
+              <a:t>, schema: Option[</a:t>
+            </a:r>
+            <a:r>
+              <a:rPr lang="en-US" sz="2400" dirty="0" err="1"/>
+              <a:t>StructType</a:t>
+            </a:r>
+            <a:r>
+              <a:rPr lang="en-US" sz="2400" dirty="0"/>
+              <a:t>], </a:t>
+            </a:r>
+            <a:r>
+              <a:rPr lang="en-US" sz="2400" dirty="0" err="1"/>
+              <a:t>providerName</a:t>
+            </a:r>
+            <a:r>
+              <a:rPr lang="en-US" sz="2400" dirty="0"/>
+              <a:t>: String, parameters: Map[String, String]): (String, </a:t>
+            </a:r>
+            <a:r>
+              <a:rPr lang="en-US" sz="2400" dirty="0" err="1"/>
+              <a:t>StructType</a:t>
+            </a:r>
+            <a:r>
+              <a:rPr lang="en-US" sz="2400" dirty="0"/>
+              <a:t>) = {</a:t>
+            </a:r>
+          </a:p>
+          <a:p>
+            <a:r>
+              <a:rPr lang="en-US" sz="2400" dirty="0"/>
+              <a:t>    (</a:t>
+            </a:r>
+            <a:r>
+              <a:rPr lang="en-US" sz="2400" dirty="0" err="1"/>
+              <a:t>shortName</a:t>
+            </a:r>
+            <a:r>
+              <a:rPr lang="en-US" sz="2400" dirty="0"/>
+              <a:t>(), </a:t>
+            </a:r>
+            <a:r>
+              <a:rPr lang="en-US" sz="2400" dirty="0" err="1"/>
+              <a:t>RandomInt.schema</a:t>
+            </a:r>
+            <a:r>
+              <a:rPr lang="en-US" sz="2400" dirty="0"/>
+              <a:t>)</a:t>
+            </a:r>
+          </a:p>
+          <a:p>
+            <a:r>
+              <a:rPr lang="en-US" sz="2400" dirty="0"/>
+              <a:t>  }</a:t>
+            </a:r>
+          </a:p>
+          <a:p>
+            <a:endParaRPr lang="en-US" sz="2400" dirty="0"/>
+          </a:p>
+          <a:p>
+            <a:r>
+              <a:rPr lang="en-US" sz="2400" dirty="0"/>
+              <a:t>  override </a:t>
+            </a:r>
+            <a:r>
+              <a:rPr lang="en-US" sz="2400" dirty="0" err="1"/>
+              <a:t>def</a:t>
+            </a:r>
+            <a:r>
+              <a:rPr lang="en-US" sz="2400" dirty="0"/>
+              <a:t> </a:t>
+            </a:r>
+            <a:r>
+              <a:rPr lang="en-US" sz="2400" dirty="0" err="1"/>
+              <a:t>c</a:t>
+            </a:r>
+            <a:r>
+              <a:rPr lang="en-US" sz="2400" b="1" dirty="0" err="1"/>
+              <a:t>reateSource</a:t>
+            </a:r>
+            <a:r>
+              <a:rPr lang="en-US" sz="2400" dirty="0"/>
+              <a:t>(</a:t>
+            </a:r>
+            <a:r>
+              <a:rPr lang="en-US" sz="2400" dirty="0" err="1"/>
+              <a:t>sqlContext</a:t>
+            </a:r>
+            <a:r>
+              <a:rPr lang="en-US" sz="2400" dirty="0"/>
+              <a:t>: </a:t>
+            </a:r>
+            <a:r>
+              <a:rPr lang="en-US" sz="2400" dirty="0" err="1"/>
+              <a:t>SQLContext</a:t>
+            </a:r>
+            <a:r>
+              <a:rPr lang="en-US" sz="2400" dirty="0"/>
+              <a:t>, </a:t>
+            </a:r>
+            <a:r>
+              <a:rPr lang="en-US" sz="2400" dirty="0" err="1"/>
+              <a:t>metadataPath</a:t>
+            </a:r>
+            <a:r>
+              <a:rPr lang="en-US" sz="2400" dirty="0"/>
+              <a:t>: String, schema: Option[</a:t>
+            </a:r>
+            <a:r>
+              <a:rPr lang="en-US" sz="2400" dirty="0" err="1"/>
+              <a:t>StructType</a:t>
+            </a:r>
+            <a:r>
+              <a:rPr lang="en-US" sz="2400" dirty="0"/>
+              <a:t>], </a:t>
+            </a:r>
+            <a:r>
+              <a:rPr lang="en-US" sz="2400" dirty="0" err="1"/>
+              <a:t>providerName</a:t>
+            </a:r>
+            <a:r>
+              <a:rPr lang="en-US" sz="2400" dirty="0"/>
+              <a:t>: String, parameters: Map[String, String]): </a:t>
+            </a:r>
+            <a:r>
+              <a:rPr lang="en-US" sz="2400" b="1" dirty="0"/>
+              <a:t>Source</a:t>
+            </a:r>
+            <a:r>
+              <a:rPr lang="en-US" sz="2400" dirty="0"/>
+              <a:t> = {</a:t>
+            </a:r>
+          </a:p>
+          <a:p>
+            <a:r>
+              <a:rPr lang="en-US" sz="2400" b="1" dirty="0"/>
+              <a:t>    new </a:t>
+            </a:r>
+            <a:r>
+              <a:rPr lang="en-US" sz="2400" b="1" dirty="0" err="1"/>
+              <a:t>RandomInt</a:t>
+            </a:r>
+            <a:r>
+              <a:rPr lang="en-US" sz="2400" b="1" dirty="0"/>
+              <a:t>(</a:t>
+            </a:r>
+            <a:r>
+              <a:rPr lang="en-US" sz="2400" b="1" dirty="0" err="1"/>
+              <a:t>sqlContext</a:t>
+            </a:r>
+            <a:r>
+              <a:rPr lang="en-US" sz="2400" b="1" dirty="0"/>
+              <a:t>)</a:t>
+            </a:r>
+          </a:p>
+          <a:p>
+            <a:r>
+              <a:rPr lang="en-US" sz="2400" dirty="0"/>
+              <a:t>  }</a:t>
+            </a:r>
+          </a:p>
+          <a:p>
+            <a:endParaRPr lang="en-US" sz="2400" dirty="0"/>
+          </a:p>
+          <a:p>
+            <a:r>
+              <a:rPr lang="en-US" sz="2400" dirty="0"/>
+              <a:t>  override </a:t>
+            </a:r>
+            <a:r>
+              <a:rPr lang="en-US" sz="2400" dirty="0" err="1"/>
+              <a:t>def</a:t>
+            </a:r>
+            <a:r>
+              <a:rPr lang="en-US" sz="2400" dirty="0"/>
+              <a:t> </a:t>
+            </a:r>
+            <a:r>
+              <a:rPr lang="en-US" sz="2400" dirty="0" err="1"/>
+              <a:t>shortName</a:t>
+            </a:r>
+            <a:r>
+              <a:rPr lang="en-US" sz="2400" dirty="0"/>
+              <a:t>(): String = "Random </a:t>
+            </a:r>
+            <a:r>
+              <a:rPr lang="en-US" sz="2400" dirty="0" err="1"/>
+              <a:t>Int</a:t>
+            </a:r>
+            <a:r>
+              <a:rPr lang="en-US" sz="2400" dirty="0"/>
+              <a:t>"</a:t>
+            </a:r>
+          </a:p>
+          <a:p>
+            <a:r>
+              <a:rPr lang="en-US" sz="2400" dirty="0"/>
+              <a:t>}</a:t>
             </a:r>
             <a:endParaRPr lang="ru-RU" sz="2400" dirty="0"/>
           </a:p>
@@ -5789,7 +6740,7 @@
     </p:spTree>
     <p:extLst>
       <p:ext uri="{BB962C8B-B14F-4D97-AF65-F5344CB8AC3E}">
-        <p14:creationId xmlns:p14="http://schemas.microsoft.com/office/powerpoint/2010/main" val="2749999757"/>
+        <p14:creationId xmlns:p14="http://schemas.microsoft.com/office/powerpoint/2010/main" val="2200473924"/>
       </p:ext>
     </p:extLst>
   </p:cSld>
@@ -5833,39 +6784,30 @@
             <p:ph type="title"/>
           </p:nvPr>
         </p:nvSpPr>
+        <p:spPr/>
+        <p:txBody>
+          <a:bodyPr/>
+          <a:lstStyle/>
+          <a:p>
+            <a:pPr algn="ctr"/>
+            <a:r>
+              <a:rPr lang="en-US" b="1" dirty="0" smtClean="0"/>
+              <a:t>Source</a:t>
+            </a:r>
+            <a:endParaRPr lang="ru-RU" b="1" dirty="0"/>
+          </a:p>
+        </p:txBody>
+      </p:sp>
+      <p:sp>
+        <p:nvSpPr>
+          <p:cNvPr id="5" name="Прямоугольник 4"/>
+          <p:cNvSpPr/>
+          <p:nvPr/>
+        </p:nvSpPr>
         <p:spPr>
           <a:xfrm>
-            <a:off x="767861" y="0"/>
-            <a:ext cx="10515600" cy="1325563"/>
-          </a:xfrm>
-        </p:spPr>
-        <p:txBody>
-          <a:bodyPr/>
-          <a:lstStyle/>
-          <a:p>
-            <a:pPr algn="ctr"/>
-            <a:r>
-              <a:rPr lang="en-US" dirty="0"/>
-              <a:t>t</a:t>
-            </a:r>
-            <a:r>
-              <a:rPr lang="en-US" dirty="0" smtClean="0"/>
-              <a:t>rait Source</a:t>
-            </a:r>
-            <a:endParaRPr lang="ru-RU" dirty="0"/>
-          </a:p>
-        </p:txBody>
-      </p:sp>
-      <p:sp>
-        <p:nvSpPr>
-          <p:cNvPr id="6" name="Прямоугольник 5"/>
-          <p:cNvSpPr/>
-          <p:nvPr/>
-        </p:nvSpPr>
-        <p:spPr>
-          <a:xfrm>
-            <a:off x="411982" y="1166843"/>
-            <a:ext cx="11535508" cy="5262979"/>
+            <a:off x="281354" y="1720840"/>
+            <a:ext cx="11836958" cy="3416320"/>
           </a:xfrm>
           <a:prstGeom prst="rect">
             <a:avLst/>
@@ -5879,116 +6821,57 @@
           <a:p>
             <a:r>
               <a:rPr lang="en-US" sz="2400" dirty="0"/>
-              <a:t> /** Returns the schema of the data from this source */</a:t>
-            </a:r>
-          </a:p>
-          <a:p>
-            <a:r>
-              <a:rPr lang="en-US" sz="2400" dirty="0"/>
-              <a:t>  </a:t>
+              <a:t>/**</a:t>
+            </a:r>
+          </a:p>
+          <a:p>
+            <a:r>
+              <a:rPr lang="en-US" sz="2400" dirty="0"/>
+              <a:t> * A source of continually arriving data for a streaming query. A [[Source]] must have a</a:t>
+            </a:r>
+          </a:p>
+          <a:p>
+            <a:r>
+              <a:rPr lang="en-US" sz="2400" dirty="0"/>
+              <a:t> * monotonically increasing notion of progress that can be represented as an [[Offset]]. Spark</a:t>
+            </a:r>
+          </a:p>
+          <a:p>
+            <a:r>
+              <a:rPr lang="en-US" sz="2400" dirty="0"/>
+              <a:t> * will regularly query each [[Source]] to see if any more data is available.</a:t>
+            </a:r>
+          </a:p>
+          <a:p>
+            <a:r>
+              <a:rPr lang="en-US" sz="2400" dirty="0"/>
+              <a:t> *</a:t>
+            </a:r>
+          </a:p>
+          <a:p>
+            <a:r>
+              <a:rPr lang="en-US" sz="2400" dirty="0"/>
+              <a:t> * Note that, we extends `</a:t>
             </a:r>
             <a:r>
               <a:rPr lang="en-US" sz="2400" dirty="0" err="1"/>
-              <a:t>def</a:t>
-            </a:r>
-            <a:r>
-              <a:rPr lang="en-US" sz="2400" dirty="0"/>
-              <a:t> schema: </a:t>
-            </a:r>
-            <a:r>
-              <a:rPr lang="en-US" sz="2400" dirty="0" err="1"/>
-              <a:t>StructType</a:t>
-            </a:r>
-            <a:endParaRPr lang="en-US" sz="2400" dirty="0"/>
-          </a:p>
-          <a:p>
-            <a:endParaRPr lang="en-US" sz="2400" dirty="0"/>
-          </a:p>
-          <a:p>
-            <a:r>
-              <a:rPr lang="en-US" sz="2400" dirty="0"/>
-              <a:t>  /**</a:t>
-            </a:r>
-          </a:p>
-          <a:p>
-            <a:r>
-              <a:rPr lang="en-US" sz="2400" dirty="0"/>
-              <a:t>   * Returns the maximum available offset for this source.</a:t>
-            </a:r>
-          </a:p>
-          <a:p>
-            <a:r>
-              <a:rPr lang="en-US" sz="2400" dirty="0"/>
-              <a:t>   * Returns `None` if this source has never received any data.</a:t>
-            </a:r>
-          </a:p>
-          <a:p>
-            <a:r>
-              <a:rPr lang="en-US" sz="2400" dirty="0"/>
-              <a:t>   */</a:t>
-            </a:r>
-          </a:p>
-          <a:p>
-            <a:r>
-              <a:rPr lang="en-US" sz="2400" dirty="0"/>
-              <a:t>  </a:t>
-            </a:r>
-            <a:r>
-              <a:rPr lang="en-US" sz="2400" dirty="0" err="1"/>
-              <a:t>def</a:t>
-            </a:r>
-            <a:r>
-              <a:rPr lang="en-US" sz="2400" dirty="0"/>
-              <a:t> </a:t>
-            </a:r>
-            <a:r>
-              <a:rPr lang="en-US" sz="2400" dirty="0" err="1"/>
-              <a:t>getOffset</a:t>
-            </a:r>
-            <a:r>
-              <a:rPr lang="en-US" sz="2400" dirty="0"/>
-              <a:t>: Option[Offset]</a:t>
-            </a:r>
-          </a:p>
-          <a:p>
-            <a:endParaRPr lang="en-US" sz="2400" dirty="0"/>
-          </a:p>
-          <a:p>
-            <a:r>
-              <a:rPr lang="en-US" sz="2400" dirty="0"/>
-              <a:t>  /**</a:t>
-            </a:r>
-          </a:p>
-          <a:p>
-            <a:r>
-              <a:rPr lang="en-US" sz="2400" dirty="0"/>
-              <a:t>   * Informs the source that Spark has completed processing all data for offsets less than or</a:t>
-            </a:r>
-          </a:p>
-          <a:p>
-            <a:r>
-              <a:rPr lang="en-US" sz="2400" dirty="0"/>
-              <a:t>   * equal to `end` and will only request offsets greater than `end` in the future.</a:t>
-            </a:r>
-          </a:p>
-          <a:p>
-            <a:r>
-              <a:rPr lang="en-US" sz="2400" dirty="0"/>
-              <a:t>   */</a:t>
-            </a:r>
-          </a:p>
-          <a:p>
-            <a:r>
-              <a:rPr lang="en-US" sz="2400" dirty="0"/>
-              <a:t>  </a:t>
-            </a:r>
-            <a:r>
-              <a:rPr lang="en-US" sz="2400" dirty="0" err="1"/>
-              <a:t>def</a:t>
-            </a:r>
-            <a:r>
-              <a:rPr lang="en-US" sz="2400" dirty="0"/>
-              <a:t> commit(end: Offset) : Unit = {}</a:t>
+              <a:t>SparkDataStream</a:t>
+            </a:r>
+            <a:r>
+              <a:rPr lang="en-US" sz="2400" dirty="0"/>
+              <a:t>` here, to make the v1 streaming source API be compatible</a:t>
+            </a:r>
+          </a:p>
+          <a:p>
+            <a:r>
+              <a:rPr lang="en-US" sz="2400" dirty="0"/>
+              <a:t> * with data source v2.</a:t>
+            </a:r>
+          </a:p>
+          <a:p>
+            <a:r>
+              <a:rPr lang="en-US" sz="2400" dirty="0"/>
+              <a:t> */</a:t>
             </a:r>
             <a:endParaRPr lang="ru-RU" sz="2400" dirty="0"/>
           </a:p>
@@ -5997,7 +6880,7 @@
     </p:spTree>
     <p:extLst>
       <p:ext uri="{BB962C8B-B14F-4D97-AF65-F5344CB8AC3E}">
-        <p14:creationId xmlns:p14="http://schemas.microsoft.com/office/powerpoint/2010/main" val="3377010737"/>
+        <p14:creationId xmlns:p14="http://schemas.microsoft.com/office/powerpoint/2010/main" val="2749999757"/>
       </p:ext>
     </p:extLst>
   </p:cSld>

</xml_diff>